<commit_message>
Add reference to cascadelake CPUs
</commit_message>
<xml_diff>
--- a/code_optimization.pptx
+++ b/code_optimization.pptx
@@ -11139,7 +11139,7 @@
           <a:graphicData uri="http://schemas.openxmlformats.org/presentationml/2006/ole">
             <mc:AlternateContent xmlns:mc="http://schemas.openxmlformats.org/markup-compatibility/2006">
               <mc:Choice xmlns:v="urn:schemas-microsoft-com:vml" Requires="v">
-                <p:oleObj spid="_x0000_s1276" name="Equation" r:id="rId3" imgW="812520" imgH="393480" progId="Equation.3">
+                <p:oleObj spid="_x0000_s1278" name="Equation" r:id="rId3" imgW="812520" imgH="393480" progId="Equation.3">
                   <p:embed/>
                 </p:oleObj>
               </mc:Choice>
@@ -11196,7 +11196,7 @@
           <a:graphicData uri="http://schemas.openxmlformats.org/presentationml/2006/ole">
             <mc:AlternateContent xmlns:mc="http://schemas.openxmlformats.org/markup-compatibility/2006">
               <mc:Choice xmlns:v="urn:schemas-microsoft-com:vml" Requires="v">
-                <p:oleObj spid="_x0000_s1277" name="Equation" r:id="rId5" imgW="2489040" imgH="431640" progId="Equation.3">
+                <p:oleObj spid="_x0000_s1279" name="Equation" r:id="rId5" imgW="2489040" imgH="431640" progId="Equation.3">
                   <p:embed/>
                 </p:oleObj>
               </mc:Choice>
@@ -21545,7 +21545,7 @@
           <a:graphicData uri="http://schemas.openxmlformats.org/presentationml/2006/ole">
             <mc:AlternateContent xmlns:mc="http://schemas.openxmlformats.org/markup-compatibility/2006">
               <mc:Choice xmlns:v="urn:schemas-microsoft-com:vml" Requires="v">
-                <p:oleObj spid="_x0000_s2267" name="Equation" r:id="rId3" imgW="1091880" imgH="1041120" progId="Equation.3">
+                <p:oleObj spid="_x0000_s2269" name="Equation" r:id="rId3" imgW="1091880" imgH="1041120" progId="Equation.3">
                   <p:embed/>
                 </p:oleObj>
               </mc:Choice>
@@ -22900,7 +22900,7 @@
           <a:graphicData uri="http://schemas.openxmlformats.org/presentationml/2006/ole">
             <mc:AlternateContent xmlns:mc="http://schemas.openxmlformats.org/markup-compatibility/2006">
               <mc:Choice xmlns:v="urn:schemas-microsoft-com:vml" Requires="v">
-                <p:oleObj spid="_x0000_s2268" name="Equation" r:id="rId5" imgW="1091880" imgH="1041120" progId="Equation.3">
+                <p:oleObj spid="_x0000_s2270" name="Equation" r:id="rId5" imgW="1091880" imgH="1041120" progId="Equation.3">
                   <p:embed/>
                 </p:oleObj>
               </mc:Choice>
@@ -30953,8 +30953,12 @@
           <a:lstStyle/>
           <a:p>
             <a:r>
+              <a:rPr lang="en-US" dirty="0"/>
+              <a:t>Skylake, </a:t>
+            </a:r>
+            <a:r>
               <a:rPr lang="en-US" dirty="0" err="1"/>
-              <a:t>Skylake</a:t>
+              <a:t>Cascadelake</a:t>
             </a:r>
             <a:r>
               <a:rPr lang="en-US" dirty="0"/>
@@ -33925,7 +33929,7 @@
           <a:graphicData uri="http://schemas.openxmlformats.org/presentationml/2006/ole">
             <mc:AlternateContent xmlns:mc="http://schemas.openxmlformats.org/markup-compatibility/2006">
               <mc:Choice xmlns:v="urn:schemas-microsoft-com:vml" Requires="v">
-                <p:oleObj spid="_x0000_s3146" name="Equation" r:id="rId3" imgW="965160" imgH="228600" progId="Equation.3">
+                <p:oleObj spid="_x0000_s3147" name="Equation" r:id="rId3" imgW="965160" imgH="228600" progId="Equation.3">
                   <p:embed/>
                 </p:oleObj>
               </mc:Choice>

</xml_diff>

<commit_message>
Change AoS versus SoA slightly
</commit_message>
<xml_diff>
--- a/code_optimization.pptx
+++ b/code_optimization.pptx
@@ -11139,7 +11139,7 @@
           <a:graphicData uri="http://schemas.openxmlformats.org/presentationml/2006/ole">
             <mc:AlternateContent xmlns:mc="http://schemas.openxmlformats.org/markup-compatibility/2006">
               <mc:Choice xmlns:v="urn:schemas-microsoft-com:vml" Requires="v">
-                <p:oleObj spid="_x0000_s1278" name="Equation" r:id="rId3" imgW="812520" imgH="393480" progId="Equation.3">
+                <p:oleObj spid="_x0000_s1282" name="Equation" r:id="rId3" imgW="812520" imgH="393480" progId="Equation.3">
                   <p:embed/>
                 </p:oleObj>
               </mc:Choice>
@@ -11196,7 +11196,7 @@
           <a:graphicData uri="http://schemas.openxmlformats.org/presentationml/2006/ole">
             <mc:AlternateContent xmlns:mc="http://schemas.openxmlformats.org/markup-compatibility/2006">
               <mc:Choice xmlns:v="urn:schemas-microsoft-com:vml" Requires="v">
-                <p:oleObj spid="_x0000_s1279" name="Equation" r:id="rId5" imgW="2489040" imgH="431640" progId="Equation.3">
+                <p:oleObj spid="_x0000_s1283" name="Equation" r:id="rId5" imgW="2489040" imgH="431640" progId="Equation.3">
                   <p:embed/>
                 </p:oleObj>
               </mc:Choice>
@@ -21545,7 +21545,7 @@
           <a:graphicData uri="http://schemas.openxmlformats.org/presentationml/2006/ole">
             <mc:AlternateContent xmlns:mc="http://schemas.openxmlformats.org/markup-compatibility/2006">
               <mc:Choice xmlns:v="urn:schemas-microsoft-com:vml" Requires="v">
-                <p:oleObj spid="_x0000_s2269" name="Equation" r:id="rId3" imgW="1091880" imgH="1041120" progId="Equation.3">
+                <p:oleObj spid="_x0000_s2273" name="Equation" r:id="rId3" imgW="1091880" imgH="1041120" progId="Equation.3">
                   <p:embed/>
                 </p:oleObj>
               </mc:Choice>
@@ -22900,7 +22900,7 @@
           <a:graphicData uri="http://schemas.openxmlformats.org/presentationml/2006/ole">
             <mc:AlternateContent xmlns:mc="http://schemas.openxmlformats.org/markup-compatibility/2006">
               <mc:Choice xmlns:v="urn:schemas-microsoft-com:vml" Requires="v">
-                <p:oleObj spid="_x0000_s2270" name="Equation" r:id="rId5" imgW="1091880" imgH="1041120" progId="Equation.3">
+                <p:oleObj spid="_x0000_s2274" name="Equation" r:id="rId5" imgW="1091880" imgH="1041120" progId="Equation.3">
                   <p:embed/>
                 </p:oleObj>
               </mc:Choice>
@@ -23694,7 +23694,7 @@
         <p:spPr>
           <a:xfrm>
             <a:off x="179512" y="2249577"/>
-            <a:ext cx="4647426" cy="1631216"/>
+            <a:ext cx="4647426" cy="1323439"/>
           </a:xfrm>
           <a:prstGeom prst="rect">
             <a:avLst/>
@@ -23746,29 +23746,6 @@
                 <a:latin typeface="Courier New" panose="02070309020205020404" pitchFamily="49" charset="0"/>
                 <a:cs typeface="Courier New" panose="02070309020205020404" pitchFamily="49" charset="0"/>
               </a:rPr>
-              <a:t>    </a:t>
-            </a:r>
-            <a:r>
-              <a:rPr lang="en-US" sz="2000" dirty="0" err="1">
-                <a:latin typeface="Courier New" panose="02070309020205020404" pitchFamily="49" charset="0"/>
-                <a:cs typeface="Courier New" panose="02070309020205020404" pitchFamily="49" charset="0"/>
-              </a:rPr>
-              <a:t>int</a:t>
-            </a:r>
-            <a:r>
-              <a:rPr lang="en-US" sz="2000" dirty="0">
-                <a:latin typeface="Courier New" panose="02070309020205020404" pitchFamily="49" charset="0"/>
-                <a:cs typeface="Courier New" panose="02070309020205020404" pitchFamily="49" charset="0"/>
-              </a:rPr>
-              <a:t> q;</a:t>
-            </a:r>
-          </a:p>
-          <a:p>
-            <a:r>
-              <a:rPr lang="en-US" sz="2000" dirty="0">
-                <a:latin typeface="Courier New" panose="02070309020205020404" pitchFamily="49" charset="0"/>
-                <a:cs typeface="Courier New" panose="02070309020205020404" pitchFamily="49" charset="0"/>
-              </a:rPr>
               <a:t>};</a:t>
             </a:r>
           </a:p>
@@ -23895,7 +23872,7 @@
         <p:spPr>
           <a:xfrm>
             <a:off x="179512" y="4390072"/>
-            <a:ext cx="4647426" cy="1631216"/>
+            <a:ext cx="4647426" cy="1323439"/>
           </a:xfrm>
           <a:prstGeom prst="rect">
             <a:avLst/>
@@ -23956,738 +23933,11 @@
                 <a:latin typeface="Courier New" panose="02070309020205020404" pitchFamily="49" charset="0"/>
                 <a:cs typeface="Courier New" panose="02070309020205020404" pitchFamily="49" charset="0"/>
               </a:rPr>
-              <a:t>    </a:t>
-            </a:r>
-            <a:r>
-              <a:rPr lang="en-US" sz="2000" dirty="0" err="1">
-                <a:latin typeface="Courier New" panose="02070309020205020404" pitchFamily="49" charset="0"/>
-                <a:cs typeface="Courier New" panose="02070309020205020404" pitchFamily="49" charset="0"/>
-              </a:rPr>
-              <a:t>int</a:t>
-            </a:r>
-            <a:r>
-              <a:rPr lang="en-US" sz="2000" dirty="0">
-                <a:latin typeface="Courier New" panose="02070309020205020404" pitchFamily="49" charset="0"/>
-                <a:cs typeface="Courier New" panose="02070309020205020404" pitchFamily="49" charset="0"/>
-              </a:rPr>
-              <a:t> q[n];</a:t>
-            </a:r>
-          </a:p>
-          <a:p>
-            <a:r>
-              <a:rPr lang="en-US" sz="2000" dirty="0">
-                <a:latin typeface="Courier New" panose="02070309020205020404" pitchFamily="49" charset="0"/>
-                <a:cs typeface="Courier New" panose="02070309020205020404" pitchFamily="49" charset="0"/>
-              </a:rPr>
               <a:t>};</a:t>
             </a:r>
           </a:p>
         </p:txBody>
       </p:sp>
-      <p:grpSp>
-        <p:nvGrpSpPr>
-          <p:cNvPr id="57" name="Group 56"/>
-          <p:cNvGrpSpPr/>
-          <p:nvPr/>
-        </p:nvGrpSpPr>
-        <p:grpSpPr>
-          <a:xfrm>
-            <a:off x="4047162" y="5308462"/>
-            <a:ext cx="4917326" cy="987330"/>
-            <a:chOff x="4047162" y="5393998"/>
-            <a:chExt cx="4917326" cy="987330"/>
-          </a:xfrm>
-        </p:grpSpPr>
-        <p:grpSp>
-          <p:nvGrpSpPr>
-            <p:cNvPr id="49" name="Group 48"/>
-            <p:cNvGrpSpPr/>
-            <p:nvPr/>
-          </p:nvGrpSpPr>
-          <p:grpSpPr>
-            <a:xfrm>
-              <a:off x="4047162" y="5393998"/>
-              <a:ext cx="4917326" cy="411266"/>
-              <a:chOff x="4047162" y="5393998"/>
-              <a:chExt cx="4917326" cy="411266"/>
-            </a:xfrm>
-          </p:grpSpPr>
-          <p:sp>
-            <p:nvSpPr>
-              <p:cNvPr id="30" name="Rectangle 29"/>
-              <p:cNvSpPr/>
-              <p:nvPr/>
-            </p:nvSpPr>
-            <p:spPr>
-              <a:xfrm>
-                <a:off x="4047162" y="5435932"/>
-                <a:ext cx="4896544" cy="369332"/>
-              </a:xfrm>
-              <a:prstGeom prst="rect">
-                <a:avLst/>
-              </a:prstGeom>
-              <a:solidFill>
-                <a:schemeClr val="bg1">
-                  <a:lumMod val="85000"/>
-                </a:schemeClr>
-              </a:solidFill>
-              <a:ln>
-                <a:noFill/>
-              </a:ln>
-            </p:spPr>
-            <p:style>
-              <a:lnRef idx="2">
-                <a:schemeClr val="accent1">
-                  <a:shade val="50000"/>
-                </a:schemeClr>
-              </a:lnRef>
-              <a:fillRef idx="1">
-                <a:schemeClr val="accent1"/>
-              </a:fillRef>
-              <a:effectRef idx="0">
-                <a:schemeClr val="accent1"/>
-              </a:effectRef>
-              <a:fontRef idx="minor">
-                <a:schemeClr val="lt1"/>
-              </a:fontRef>
-            </p:style>
-            <p:txBody>
-              <a:bodyPr rtlCol="0" anchor="ctr"/>
-              <a:lstStyle/>
-              <a:p>
-                <a:pPr algn="ctr"/>
-                <a:endParaRPr lang="en-US"/>
-              </a:p>
-            </p:txBody>
-          </p:sp>
-          <p:sp>
-            <p:nvSpPr>
-              <p:cNvPr id="31" name="TextBox 30"/>
-              <p:cNvSpPr txBox="1"/>
-              <p:nvPr/>
-            </p:nvSpPr>
-            <p:spPr>
-              <a:xfrm>
-                <a:off x="4684730" y="5435932"/>
-                <a:ext cx="319318" cy="369332"/>
-              </a:xfrm>
-              <a:prstGeom prst="rect">
-                <a:avLst/>
-              </a:prstGeom>
-              <a:noFill/>
-            </p:spPr>
-            <p:txBody>
-              <a:bodyPr wrap="none" rtlCol="0">
-                <a:spAutoFit/>
-              </a:bodyPr>
-              <a:lstStyle/>
-              <a:p>
-                <a:r>
-                  <a:rPr lang="en-US" dirty="0"/>
-                  <a:t>x</a:t>
-                </a:r>
-                <a:r>
-                  <a:rPr lang="en-US" baseline="-25000" dirty="0"/>
-                  <a:t>i</a:t>
-                </a:r>
-              </a:p>
-            </p:txBody>
-          </p:sp>
-          <p:sp>
-            <p:nvSpPr>
-              <p:cNvPr id="32" name="TextBox 31"/>
-              <p:cNvSpPr txBox="1"/>
-              <p:nvPr/>
-            </p:nvSpPr>
-            <p:spPr>
-              <a:xfrm>
-                <a:off x="5286118" y="5435932"/>
-                <a:ext cx="474810" cy="369332"/>
-              </a:xfrm>
-              <a:prstGeom prst="rect">
-                <a:avLst/>
-              </a:prstGeom>
-              <a:noFill/>
-            </p:spPr>
-            <p:txBody>
-              <a:bodyPr wrap="none" rtlCol="0">
-                <a:spAutoFit/>
-              </a:bodyPr>
-              <a:lstStyle/>
-              <a:p>
-                <a:r>
-                  <a:rPr lang="en-US" dirty="0"/>
-                  <a:t>x</a:t>
-                </a:r>
-                <a:r>
-                  <a:rPr lang="en-US" baseline="-25000" dirty="0"/>
-                  <a:t>i+1</a:t>
-                </a:r>
-              </a:p>
-            </p:txBody>
-          </p:sp>
-          <p:sp>
-            <p:nvSpPr>
-              <p:cNvPr id="33" name="TextBox 32"/>
-              <p:cNvSpPr txBox="1"/>
-              <p:nvPr/>
-            </p:nvSpPr>
-            <p:spPr>
-              <a:xfrm>
-                <a:off x="5844872" y="5435932"/>
-                <a:ext cx="474810" cy="369332"/>
-              </a:xfrm>
-              <a:prstGeom prst="rect">
-                <a:avLst/>
-              </a:prstGeom>
-              <a:noFill/>
-            </p:spPr>
-            <p:txBody>
-              <a:bodyPr wrap="none" rtlCol="0">
-                <a:spAutoFit/>
-              </a:bodyPr>
-              <a:lstStyle/>
-              <a:p>
-                <a:r>
-                  <a:rPr lang="en-US" dirty="0"/>
-                  <a:t>x</a:t>
-                </a:r>
-                <a:r>
-                  <a:rPr lang="en-US" baseline="-25000" dirty="0"/>
-                  <a:t>i+2</a:t>
-                </a:r>
-              </a:p>
-            </p:txBody>
-          </p:sp>
-          <p:sp>
-            <p:nvSpPr>
-              <p:cNvPr id="34" name="TextBox 33"/>
-              <p:cNvSpPr txBox="1"/>
-              <p:nvPr/>
-            </p:nvSpPr>
-            <p:spPr>
-              <a:xfrm>
-                <a:off x="7110560" y="5435932"/>
-                <a:ext cx="324128" cy="369332"/>
-              </a:xfrm>
-              <a:prstGeom prst="rect">
-                <a:avLst/>
-              </a:prstGeom>
-              <a:noFill/>
-            </p:spPr>
-            <p:txBody>
-              <a:bodyPr wrap="none" rtlCol="0">
-                <a:spAutoFit/>
-              </a:bodyPr>
-              <a:lstStyle/>
-              <a:p>
-                <a:r>
-                  <a:rPr lang="en-US" dirty="0" err="1"/>
-                  <a:t>y</a:t>
-                </a:r>
-                <a:r>
-                  <a:rPr lang="en-US" baseline="-25000" dirty="0" err="1"/>
-                  <a:t>i</a:t>
-                </a:r>
-                <a:endParaRPr lang="en-US" baseline="-25000" dirty="0"/>
-              </a:p>
-            </p:txBody>
-          </p:sp>
-          <p:sp>
-            <p:nvSpPr>
-              <p:cNvPr id="35" name="TextBox 34"/>
-              <p:cNvSpPr txBox="1"/>
-              <p:nvPr/>
-            </p:nvSpPr>
-            <p:spPr>
-              <a:xfrm>
-                <a:off x="7668344" y="5435932"/>
-                <a:ext cx="479618" cy="369332"/>
-              </a:xfrm>
-              <a:prstGeom prst="rect">
-                <a:avLst/>
-              </a:prstGeom>
-              <a:noFill/>
-            </p:spPr>
-            <p:txBody>
-              <a:bodyPr wrap="none" rtlCol="0">
-                <a:spAutoFit/>
-              </a:bodyPr>
-              <a:lstStyle/>
-              <a:p>
-                <a:r>
-                  <a:rPr lang="en-US" dirty="0"/>
-                  <a:t>y</a:t>
-                </a:r>
-                <a:r>
-                  <a:rPr lang="en-US" baseline="-25000" dirty="0"/>
-                  <a:t>i+1</a:t>
-                </a:r>
-              </a:p>
-            </p:txBody>
-          </p:sp>
-          <p:cxnSp>
-            <p:nvCxnSpPr>
-              <p:cNvPr id="36" name="Straight Connector 35"/>
-              <p:cNvCxnSpPr/>
-              <p:nvPr/>
-            </p:nvCxnSpPr>
-            <p:spPr>
-              <a:xfrm>
-                <a:off x="5250516" y="5425541"/>
-                <a:ext cx="0" cy="369332"/>
-              </a:xfrm>
-              <a:prstGeom prst="line">
-                <a:avLst/>
-              </a:prstGeom>
-              <a:ln w="19050">
-                <a:solidFill>
-                  <a:schemeClr val="tx1"/>
-                </a:solidFill>
-              </a:ln>
-            </p:spPr>
-            <p:style>
-              <a:lnRef idx="1">
-                <a:schemeClr val="accent1"/>
-              </a:lnRef>
-              <a:fillRef idx="0">
-                <a:schemeClr val="accent1"/>
-              </a:fillRef>
-              <a:effectRef idx="0">
-                <a:schemeClr val="accent1"/>
-              </a:effectRef>
-              <a:fontRef idx="minor">
-                <a:schemeClr val="tx1"/>
-              </a:fontRef>
-            </p:style>
-          </p:cxnSp>
-          <p:cxnSp>
-            <p:nvCxnSpPr>
-              <p:cNvPr id="37" name="Straight Connector 36"/>
-              <p:cNvCxnSpPr/>
-              <p:nvPr/>
-            </p:nvCxnSpPr>
-            <p:spPr>
-              <a:xfrm>
-                <a:off x="5847362" y="5424442"/>
-                <a:ext cx="0" cy="369332"/>
-              </a:xfrm>
-              <a:prstGeom prst="line">
-                <a:avLst/>
-              </a:prstGeom>
-              <a:ln w="19050">
-                <a:solidFill>
-                  <a:schemeClr val="tx1"/>
-                </a:solidFill>
-              </a:ln>
-            </p:spPr>
-            <p:style>
-              <a:lnRef idx="1">
-                <a:schemeClr val="accent1"/>
-              </a:lnRef>
-              <a:fillRef idx="0">
-                <a:schemeClr val="accent1"/>
-              </a:fillRef>
-              <a:effectRef idx="0">
-                <a:schemeClr val="accent1"/>
-              </a:effectRef>
-              <a:fontRef idx="minor">
-                <a:schemeClr val="tx1"/>
-              </a:fontRef>
-            </p:style>
-          </p:cxnSp>
-          <p:cxnSp>
-            <p:nvCxnSpPr>
-              <p:cNvPr id="38" name="Straight Connector 37"/>
-              <p:cNvCxnSpPr/>
-              <p:nvPr/>
-            </p:nvCxnSpPr>
-            <p:spPr>
-              <a:xfrm>
-                <a:off x="6423426" y="5424442"/>
-                <a:ext cx="0" cy="369332"/>
-              </a:xfrm>
-              <a:prstGeom prst="line">
-                <a:avLst/>
-              </a:prstGeom>
-              <a:ln w="19050">
-                <a:solidFill>
-                  <a:schemeClr val="tx1"/>
-                </a:solidFill>
-              </a:ln>
-            </p:spPr>
-            <p:style>
-              <a:lnRef idx="1">
-                <a:schemeClr val="accent1"/>
-              </a:lnRef>
-              <a:fillRef idx="0">
-                <a:schemeClr val="accent1"/>
-              </a:fillRef>
-              <a:effectRef idx="0">
-                <a:schemeClr val="accent1"/>
-              </a:effectRef>
-              <a:fontRef idx="minor">
-                <a:schemeClr val="tx1"/>
-              </a:fontRef>
-            </p:style>
-          </p:cxnSp>
-          <p:cxnSp>
-            <p:nvCxnSpPr>
-              <p:cNvPr id="39" name="Straight Connector 38"/>
-              <p:cNvCxnSpPr/>
-              <p:nvPr/>
-            </p:nvCxnSpPr>
-            <p:spPr>
-              <a:xfrm>
-                <a:off x="4695234" y="5434833"/>
-                <a:ext cx="0" cy="369332"/>
-              </a:xfrm>
-              <a:prstGeom prst="line">
-                <a:avLst/>
-              </a:prstGeom>
-              <a:ln w="19050">
-                <a:solidFill>
-                  <a:schemeClr val="tx1"/>
-                </a:solidFill>
-              </a:ln>
-            </p:spPr>
-            <p:style>
-              <a:lnRef idx="1">
-                <a:schemeClr val="accent1"/>
-              </a:lnRef>
-              <a:fillRef idx="0">
-                <a:schemeClr val="accent1"/>
-              </a:fillRef>
-              <a:effectRef idx="0">
-                <a:schemeClr val="accent1"/>
-              </a:effectRef>
-              <a:fontRef idx="minor">
-                <a:schemeClr val="tx1"/>
-              </a:fontRef>
-            </p:style>
-          </p:cxnSp>
-          <p:cxnSp>
-            <p:nvCxnSpPr>
-              <p:cNvPr id="40" name="Straight Connector 39"/>
-              <p:cNvCxnSpPr/>
-              <p:nvPr/>
-            </p:nvCxnSpPr>
-            <p:spPr>
-              <a:xfrm>
-                <a:off x="7061107" y="5424442"/>
-                <a:ext cx="0" cy="369332"/>
-              </a:xfrm>
-              <a:prstGeom prst="line">
-                <a:avLst/>
-              </a:prstGeom>
-              <a:ln w="19050">
-                <a:solidFill>
-                  <a:schemeClr val="tx1"/>
-                </a:solidFill>
-              </a:ln>
-            </p:spPr>
-            <p:style>
-              <a:lnRef idx="1">
-                <a:schemeClr val="accent1"/>
-              </a:lnRef>
-              <a:fillRef idx="0">
-                <a:schemeClr val="accent1"/>
-              </a:fillRef>
-              <a:effectRef idx="0">
-                <a:schemeClr val="accent1"/>
-              </a:effectRef>
-              <a:fontRef idx="minor">
-                <a:schemeClr val="tx1"/>
-              </a:fontRef>
-            </p:style>
-          </p:cxnSp>
-          <p:cxnSp>
-            <p:nvCxnSpPr>
-              <p:cNvPr id="41" name="Straight Connector 40"/>
-              <p:cNvCxnSpPr/>
-              <p:nvPr/>
-            </p:nvCxnSpPr>
-            <p:spPr>
-              <a:xfrm>
-                <a:off x="7647562" y="5424442"/>
-                <a:ext cx="0" cy="369332"/>
-              </a:xfrm>
-              <a:prstGeom prst="line">
-                <a:avLst/>
-              </a:prstGeom>
-              <a:ln w="19050">
-                <a:solidFill>
-                  <a:schemeClr val="tx1"/>
-                </a:solidFill>
-              </a:ln>
-            </p:spPr>
-            <p:style>
-              <a:lnRef idx="1">
-                <a:schemeClr val="accent1"/>
-              </a:lnRef>
-              <a:fillRef idx="0">
-                <a:schemeClr val="accent1"/>
-              </a:fillRef>
-              <a:effectRef idx="0">
-                <a:schemeClr val="accent1"/>
-              </a:effectRef>
-              <a:fontRef idx="minor">
-                <a:schemeClr val="tx1"/>
-              </a:fontRef>
-            </p:style>
-          </p:cxnSp>
-          <p:cxnSp>
-            <p:nvCxnSpPr>
-              <p:cNvPr id="42" name="Straight Connector 41"/>
-              <p:cNvCxnSpPr/>
-              <p:nvPr/>
-            </p:nvCxnSpPr>
-            <p:spPr>
-              <a:xfrm>
-                <a:off x="8254070" y="5435932"/>
-                <a:ext cx="0" cy="369332"/>
-              </a:xfrm>
-              <a:prstGeom prst="line">
-                <a:avLst/>
-              </a:prstGeom>
-              <a:ln w="19050">
-                <a:solidFill>
-                  <a:schemeClr val="tx1"/>
-                </a:solidFill>
-              </a:ln>
-            </p:spPr>
-            <p:style>
-              <a:lnRef idx="1">
-                <a:schemeClr val="accent1"/>
-              </a:lnRef>
-              <a:fillRef idx="0">
-                <a:schemeClr val="accent1"/>
-              </a:fillRef>
-              <a:effectRef idx="0">
-                <a:schemeClr val="accent1"/>
-              </a:effectRef>
-              <a:fontRef idx="minor">
-                <a:schemeClr val="tx1"/>
-              </a:fontRef>
-            </p:style>
-          </p:cxnSp>
-          <p:cxnSp>
-            <p:nvCxnSpPr>
-              <p:cNvPr id="43" name="Straight Connector 42"/>
-              <p:cNvCxnSpPr/>
-              <p:nvPr/>
-            </p:nvCxnSpPr>
-            <p:spPr>
-              <a:xfrm>
-                <a:off x="4047162" y="5434833"/>
-                <a:ext cx="4896544" cy="0"/>
-              </a:xfrm>
-              <a:prstGeom prst="line">
-                <a:avLst/>
-              </a:prstGeom>
-              <a:ln w="19050">
-                <a:solidFill>
-                  <a:schemeClr val="tx1"/>
-                </a:solidFill>
-              </a:ln>
-            </p:spPr>
-            <p:style>
-              <a:lnRef idx="1">
-                <a:schemeClr val="accent1"/>
-              </a:lnRef>
-              <a:fillRef idx="0">
-                <a:schemeClr val="accent1"/>
-              </a:fillRef>
-              <a:effectRef idx="0">
-                <a:schemeClr val="accent1"/>
-              </a:effectRef>
-              <a:fontRef idx="minor">
-                <a:schemeClr val="tx1"/>
-              </a:fontRef>
-            </p:style>
-          </p:cxnSp>
-          <p:cxnSp>
-            <p:nvCxnSpPr>
-              <p:cNvPr id="44" name="Straight Connector 43"/>
-              <p:cNvCxnSpPr/>
-              <p:nvPr/>
-            </p:nvCxnSpPr>
-            <p:spPr>
-              <a:xfrm>
-                <a:off x="4067944" y="5805264"/>
-                <a:ext cx="4896544" cy="0"/>
-              </a:xfrm>
-              <a:prstGeom prst="line">
-                <a:avLst/>
-              </a:prstGeom>
-              <a:ln w="19050">
-                <a:solidFill>
-                  <a:schemeClr val="tx1"/>
-                </a:solidFill>
-              </a:ln>
-            </p:spPr>
-            <p:style>
-              <a:lnRef idx="1">
-                <a:schemeClr val="accent1"/>
-              </a:lnRef>
-              <a:fillRef idx="0">
-                <a:schemeClr val="accent1"/>
-              </a:fillRef>
-              <a:effectRef idx="0">
-                <a:schemeClr val="accent1"/>
-              </a:effectRef>
-              <a:fontRef idx="minor">
-                <a:schemeClr val="tx1"/>
-              </a:fontRef>
-            </p:style>
-          </p:cxnSp>
-          <p:sp>
-            <p:nvSpPr>
-              <p:cNvPr id="45" name="TextBox 44"/>
-              <p:cNvSpPr txBox="1"/>
-              <p:nvPr/>
-            </p:nvSpPr>
-            <p:spPr>
-              <a:xfrm>
-                <a:off x="8456326" y="5393998"/>
-                <a:ext cx="343364" cy="369332"/>
-              </a:xfrm>
-              <a:prstGeom prst="rect">
-                <a:avLst/>
-              </a:prstGeom>
-              <a:noFill/>
-            </p:spPr>
-            <p:txBody>
-              <a:bodyPr wrap="none" rtlCol="0">
-                <a:spAutoFit/>
-              </a:bodyPr>
-              <a:lstStyle/>
-              <a:p>
-                <a:r>
-                  <a:rPr lang="en-US" dirty="0"/>
-                  <a:t>…</a:t>
-                </a:r>
-              </a:p>
-            </p:txBody>
-          </p:sp>
-          <p:sp>
-            <p:nvSpPr>
-              <p:cNvPr id="46" name="TextBox 45"/>
-              <p:cNvSpPr txBox="1"/>
-              <p:nvPr/>
-            </p:nvSpPr>
-            <p:spPr>
-              <a:xfrm>
-                <a:off x="4191178" y="5393998"/>
-                <a:ext cx="343364" cy="369332"/>
-              </a:xfrm>
-              <a:prstGeom prst="rect">
-                <a:avLst/>
-              </a:prstGeom>
-              <a:noFill/>
-            </p:spPr>
-            <p:txBody>
-              <a:bodyPr wrap="none" rtlCol="0">
-                <a:spAutoFit/>
-              </a:bodyPr>
-              <a:lstStyle/>
-              <a:p>
-                <a:r>
-                  <a:rPr lang="en-US" dirty="0"/>
-                  <a:t>…</a:t>
-                </a:r>
-              </a:p>
-            </p:txBody>
-          </p:sp>
-        </p:grpSp>
-        <p:grpSp>
-          <p:nvGrpSpPr>
-            <p:cNvPr id="53" name="Group 52"/>
-            <p:cNvGrpSpPr/>
-            <p:nvPr/>
-          </p:nvGrpSpPr>
-          <p:grpSpPr>
-            <a:xfrm>
-              <a:off x="4705625" y="5898054"/>
-              <a:ext cx="2386655" cy="483274"/>
-              <a:chOff x="3748739" y="5373216"/>
-              <a:chExt cx="2386655" cy="483274"/>
-            </a:xfrm>
-          </p:grpSpPr>
-          <p:sp>
-            <p:nvSpPr>
-              <p:cNvPr id="54" name="Left Brace 53"/>
-              <p:cNvSpPr/>
-              <p:nvPr/>
-            </p:nvSpPr>
-            <p:spPr>
-              <a:xfrm rot="16200000">
-                <a:off x="4870059" y="4251896"/>
-                <a:ext cx="144016" cy="2386655"/>
-              </a:xfrm>
-              <a:prstGeom prst="leftBrace">
-                <a:avLst/>
-              </a:prstGeom>
-              <a:ln w="19050">
-                <a:solidFill>
-                  <a:schemeClr val="tx1"/>
-                </a:solidFill>
-              </a:ln>
-            </p:spPr>
-            <p:style>
-              <a:lnRef idx="1">
-                <a:schemeClr val="accent1"/>
-              </a:lnRef>
-              <a:fillRef idx="0">
-                <a:schemeClr val="accent1"/>
-              </a:fillRef>
-              <a:effectRef idx="0">
-                <a:schemeClr val="accent1"/>
-              </a:effectRef>
-              <a:fontRef idx="minor">
-                <a:schemeClr val="tx1"/>
-              </a:fontRef>
-            </p:style>
-            <p:txBody>
-              <a:bodyPr rtlCol="0" anchor="ctr"/>
-              <a:lstStyle/>
-              <a:p>
-                <a:pPr algn="ctr"/>
-                <a:endParaRPr lang="en-US"/>
-              </a:p>
-            </p:txBody>
-          </p:sp>
-          <p:sp>
-            <p:nvSpPr>
-              <p:cNvPr id="55" name="TextBox 54"/>
-              <p:cNvSpPr txBox="1"/>
-              <p:nvPr/>
-            </p:nvSpPr>
-            <p:spPr>
-              <a:xfrm>
-                <a:off x="4386002" y="5487158"/>
-                <a:ext cx="1122102" cy="369332"/>
-              </a:xfrm>
-              <a:prstGeom prst="rect">
-                <a:avLst/>
-              </a:prstGeom>
-              <a:noFill/>
-            </p:spPr>
-            <p:txBody>
-              <a:bodyPr wrap="none" rtlCol="0">
-                <a:spAutoFit/>
-              </a:bodyPr>
-              <a:lstStyle/>
-              <a:p>
-                <a:r>
-                  <a:rPr lang="en-US" dirty="0"/>
-                  <a:t>cache line</a:t>
-                </a:r>
-              </a:p>
-            </p:txBody>
-          </p:sp>
-        </p:grpSp>
-      </p:grpSp>
       <p:grpSp>
         <p:nvGrpSpPr>
           <p:cNvPr id="59" name="Group 58"/>
@@ -24697,9 +23947,9 @@
         <p:grpSpPr>
           <a:xfrm>
             <a:off x="4036771" y="2613892"/>
-            <a:ext cx="4917326" cy="987330"/>
+            <a:ext cx="4917326" cy="986781"/>
             <a:chOff x="4182969" y="3455188"/>
-            <a:chExt cx="4917326" cy="987330"/>
+            <a:chExt cx="4917326" cy="986781"/>
           </a:xfrm>
         </p:grpSpPr>
         <p:grpSp>
@@ -24710,10 +23960,10 @@
           </p:nvGrpSpPr>
           <p:grpSpPr>
             <a:xfrm>
-              <a:off x="4841432" y="3959244"/>
-              <a:ext cx="2386655" cy="483274"/>
-              <a:chOff x="3748739" y="5373216"/>
-              <a:chExt cx="2386655" cy="483274"/>
+              <a:off x="4841433" y="3959244"/>
+              <a:ext cx="3991567" cy="482725"/>
+              <a:chOff x="3748740" y="5373216"/>
+              <a:chExt cx="3991567" cy="482725"/>
             </a:xfrm>
           </p:grpSpPr>
           <p:sp>
@@ -24724,8 +23974,8 @@
             </p:nvSpPr>
             <p:spPr>
               <a:xfrm rot="16200000">
-                <a:off x="4870059" y="4251896"/>
-                <a:ext cx="144016" cy="2386655"/>
+                <a:off x="5675873" y="3446083"/>
+                <a:ext cx="137302" cy="3991567"/>
               </a:xfrm>
               <a:prstGeom prst="leftBrace">
                 <a:avLst/>
@@ -24767,7 +24017,7 @@
             </p:nvSpPr>
             <p:spPr>
               <a:xfrm>
-                <a:off x="4386002" y="5487158"/>
+                <a:off x="5183473" y="5486609"/>
                 <a:ext cx="1122102" cy="369332"/>
               </a:xfrm>
               <a:prstGeom prst="rect">
@@ -24961,39 +24211,6 @@
             <p:spPr>
               <a:xfrm>
                 <a:off x="7246367" y="3497122"/>
-                <a:ext cx="341760" cy="369332"/>
-              </a:xfrm>
-              <a:prstGeom prst="rect">
-                <a:avLst/>
-              </a:prstGeom>
-              <a:noFill/>
-            </p:spPr>
-            <p:txBody>
-              <a:bodyPr wrap="none" rtlCol="0">
-                <a:spAutoFit/>
-              </a:bodyPr>
-              <a:lstStyle/>
-              <a:p>
-                <a:r>
-                  <a:rPr lang="en-US" dirty="0"/>
-                  <a:t>q</a:t>
-                </a:r>
-                <a:r>
-                  <a:rPr lang="en-US" baseline="-25000" dirty="0"/>
-                  <a:t>i</a:t>
-                </a:r>
-              </a:p>
-            </p:txBody>
-          </p:sp>
-          <p:sp>
-            <p:nvSpPr>
-              <p:cNvPr id="11" name="TextBox 10"/>
-              <p:cNvSpPr txBox="1"/>
-              <p:nvPr/>
-            </p:nvSpPr>
-            <p:spPr>
-              <a:xfrm>
-                <a:off x="7804151" y="3497122"/>
                 <a:ext cx="474810" cy="369332"/>
               </a:xfrm>
               <a:prstGeom prst="rect">
@@ -25010,6 +24227,39 @@
                 <a:r>
                   <a:rPr lang="en-US" dirty="0"/>
                   <a:t>x</a:t>
+                </a:r>
+                <a:r>
+                  <a:rPr lang="en-US" baseline="-25000" dirty="0"/>
+                  <a:t>i+1</a:t>
+                </a:r>
+              </a:p>
+            </p:txBody>
+          </p:sp>
+          <p:sp>
+            <p:nvSpPr>
+              <p:cNvPr id="11" name="TextBox 10"/>
+              <p:cNvSpPr txBox="1"/>
+              <p:nvPr/>
+            </p:nvSpPr>
+            <p:spPr>
+              <a:xfrm>
+                <a:off x="7804151" y="3497122"/>
+                <a:ext cx="479618" cy="369332"/>
+              </a:xfrm>
+              <a:prstGeom prst="rect">
+                <a:avLst/>
+              </a:prstGeom>
+              <a:noFill/>
+            </p:spPr>
+            <p:txBody>
+              <a:bodyPr wrap="none" rtlCol="0">
+                <a:spAutoFit/>
+              </a:bodyPr>
+              <a:lstStyle/>
+              <a:p>
+                <a:r>
+                  <a:rPr lang="en-US" dirty="0"/>
+                  <a:t>y</a:t>
                 </a:r>
                 <a:r>
                   <a:rPr lang="en-US" baseline="-25000" dirty="0"/>
@@ -25476,6 +24726,766 @@
           </a:p>
         </p:txBody>
       </p:sp>
+      <p:grpSp>
+        <p:nvGrpSpPr>
+          <p:cNvPr id="19" name="Group 18">
+            <a:extLst>
+              <a:ext uri="{FF2B5EF4-FFF2-40B4-BE49-F238E27FC236}">
+                <a16:creationId xmlns:a16="http://schemas.microsoft.com/office/drawing/2014/main" id="{AF51AFD8-0ABD-4F2C-965A-765995676026}"/>
+              </a:ext>
+            </a:extLst>
+          </p:cNvPr>
+          <p:cNvGrpSpPr/>
+          <p:nvPr/>
+        </p:nvGrpSpPr>
+        <p:grpSpPr>
+          <a:xfrm>
+            <a:off x="4047162" y="5301365"/>
+            <a:ext cx="4917326" cy="994427"/>
+            <a:chOff x="4047162" y="5301365"/>
+            <a:chExt cx="4917326" cy="994427"/>
+          </a:xfrm>
+        </p:grpSpPr>
+        <p:grpSp>
+          <p:nvGrpSpPr>
+            <p:cNvPr id="57" name="Group 56"/>
+            <p:cNvGrpSpPr/>
+            <p:nvPr/>
+          </p:nvGrpSpPr>
+          <p:grpSpPr>
+            <a:xfrm>
+              <a:off x="4047162" y="5308462"/>
+              <a:ext cx="4917326" cy="987330"/>
+              <a:chOff x="4047162" y="5393998"/>
+              <a:chExt cx="4917326" cy="987330"/>
+            </a:xfrm>
+          </p:grpSpPr>
+          <p:grpSp>
+            <p:nvGrpSpPr>
+              <p:cNvPr id="49" name="Group 48"/>
+              <p:cNvGrpSpPr/>
+              <p:nvPr/>
+            </p:nvGrpSpPr>
+            <p:grpSpPr>
+              <a:xfrm>
+                <a:off x="4047162" y="5393998"/>
+                <a:ext cx="4917326" cy="411266"/>
+                <a:chOff x="4047162" y="5393998"/>
+                <a:chExt cx="4917326" cy="411266"/>
+              </a:xfrm>
+            </p:grpSpPr>
+            <p:sp>
+              <p:nvSpPr>
+                <p:cNvPr id="30" name="Rectangle 29"/>
+                <p:cNvSpPr/>
+                <p:nvPr/>
+              </p:nvSpPr>
+              <p:spPr>
+                <a:xfrm>
+                  <a:off x="4047162" y="5435932"/>
+                  <a:ext cx="4896544" cy="369332"/>
+                </a:xfrm>
+                <a:prstGeom prst="rect">
+                  <a:avLst/>
+                </a:prstGeom>
+                <a:solidFill>
+                  <a:schemeClr val="bg1">
+                    <a:lumMod val="85000"/>
+                  </a:schemeClr>
+                </a:solidFill>
+                <a:ln>
+                  <a:noFill/>
+                </a:ln>
+              </p:spPr>
+              <p:style>
+                <a:lnRef idx="2">
+                  <a:schemeClr val="accent1">
+                    <a:shade val="50000"/>
+                  </a:schemeClr>
+                </a:lnRef>
+                <a:fillRef idx="1">
+                  <a:schemeClr val="accent1"/>
+                </a:fillRef>
+                <a:effectRef idx="0">
+                  <a:schemeClr val="accent1"/>
+                </a:effectRef>
+                <a:fontRef idx="minor">
+                  <a:schemeClr val="lt1"/>
+                </a:fontRef>
+              </p:style>
+              <p:txBody>
+                <a:bodyPr rtlCol="0" anchor="ctr"/>
+                <a:lstStyle/>
+                <a:p>
+                  <a:pPr algn="ctr"/>
+                  <a:endParaRPr lang="en-US" dirty="0"/>
+                </a:p>
+              </p:txBody>
+            </p:sp>
+            <p:sp>
+              <p:nvSpPr>
+                <p:cNvPr id="31" name="TextBox 30"/>
+                <p:cNvSpPr txBox="1"/>
+                <p:nvPr/>
+              </p:nvSpPr>
+              <p:spPr>
+                <a:xfrm>
+                  <a:off x="4684730" y="5435932"/>
+                  <a:ext cx="319318" cy="369332"/>
+                </a:xfrm>
+                <a:prstGeom prst="rect">
+                  <a:avLst/>
+                </a:prstGeom>
+                <a:noFill/>
+              </p:spPr>
+              <p:txBody>
+                <a:bodyPr wrap="none" rtlCol="0">
+                  <a:spAutoFit/>
+                </a:bodyPr>
+                <a:lstStyle/>
+                <a:p>
+                  <a:r>
+                    <a:rPr lang="en-US" dirty="0"/>
+                    <a:t>x</a:t>
+                  </a:r>
+                  <a:r>
+                    <a:rPr lang="en-US" baseline="-25000" dirty="0"/>
+                    <a:t>i</a:t>
+                  </a:r>
+                </a:p>
+              </p:txBody>
+            </p:sp>
+            <p:sp>
+              <p:nvSpPr>
+                <p:cNvPr id="32" name="TextBox 31"/>
+                <p:cNvSpPr txBox="1"/>
+                <p:nvPr/>
+              </p:nvSpPr>
+              <p:spPr>
+                <a:xfrm>
+                  <a:off x="5286118" y="5435932"/>
+                  <a:ext cx="474810" cy="369332"/>
+                </a:xfrm>
+                <a:prstGeom prst="rect">
+                  <a:avLst/>
+                </a:prstGeom>
+                <a:noFill/>
+              </p:spPr>
+              <p:txBody>
+                <a:bodyPr wrap="none" rtlCol="0">
+                  <a:spAutoFit/>
+                </a:bodyPr>
+                <a:lstStyle/>
+                <a:p>
+                  <a:r>
+                    <a:rPr lang="en-US" dirty="0"/>
+                    <a:t>x</a:t>
+                  </a:r>
+                  <a:r>
+                    <a:rPr lang="en-US" baseline="-25000" dirty="0"/>
+                    <a:t>i+1</a:t>
+                  </a:r>
+                </a:p>
+              </p:txBody>
+            </p:sp>
+            <p:sp>
+              <p:nvSpPr>
+                <p:cNvPr id="33" name="TextBox 32"/>
+                <p:cNvSpPr txBox="1"/>
+                <p:nvPr/>
+              </p:nvSpPr>
+              <p:spPr>
+                <a:xfrm>
+                  <a:off x="5844872" y="5435932"/>
+                  <a:ext cx="474810" cy="369332"/>
+                </a:xfrm>
+                <a:prstGeom prst="rect">
+                  <a:avLst/>
+                </a:prstGeom>
+                <a:noFill/>
+              </p:spPr>
+              <p:txBody>
+                <a:bodyPr wrap="none" rtlCol="0">
+                  <a:spAutoFit/>
+                </a:bodyPr>
+                <a:lstStyle/>
+                <a:p>
+                  <a:r>
+                    <a:rPr lang="en-US" dirty="0"/>
+                    <a:t>x</a:t>
+                  </a:r>
+                  <a:r>
+                    <a:rPr lang="en-US" baseline="-25000" dirty="0"/>
+                    <a:t>i+2</a:t>
+                  </a:r>
+                </a:p>
+              </p:txBody>
+            </p:sp>
+            <p:sp>
+              <p:nvSpPr>
+                <p:cNvPr id="34" name="TextBox 33"/>
+                <p:cNvSpPr txBox="1"/>
+                <p:nvPr/>
+              </p:nvSpPr>
+              <p:spPr>
+                <a:xfrm>
+                  <a:off x="7110560" y="5435932"/>
+                  <a:ext cx="324128" cy="369332"/>
+                </a:xfrm>
+                <a:prstGeom prst="rect">
+                  <a:avLst/>
+                </a:prstGeom>
+                <a:noFill/>
+              </p:spPr>
+              <p:txBody>
+                <a:bodyPr wrap="none" rtlCol="0">
+                  <a:spAutoFit/>
+                </a:bodyPr>
+                <a:lstStyle/>
+                <a:p>
+                  <a:r>
+                    <a:rPr lang="en-US" dirty="0" err="1"/>
+                    <a:t>y</a:t>
+                  </a:r>
+                  <a:r>
+                    <a:rPr lang="en-US" baseline="-25000" dirty="0" err="1"/>
+                    <a:t>i</a:t>
+                  </a:r>
+                  <a:endParaRPr lang="en-US" baseline="-25000" dirty="0"/>
+                </a:p>
+              </p:txBody>
+            </p:sp>
+            <p:sp>
+              <p:nvSpPr>
+                <p:cNvPr id="35" name="TextBox 34"/>
+                <p:cNvSpPr txBox="1"/>
+                <p:nvPr/>
+              </p:nvSpPr>
+              <p:spPr>
+                <a:xfrm>
+                  <a:off x="7668344" y="5435932"/>
+                  <a:ext cx="479618" cy="369332"/>
+                </a:xfrm>
+                <a:prstGeom prst="rect">
+                  <a:avLst/>
+                </a:prstGeom>
+                <a:noFill/>
+              </p:spPr>
+              <p:txBody>
+                <a:bodyPr wrap="none" rtlCol="0">
+                  <a:spAutoFit/>
+                </a:bodyPr>
+                <a:lstStyle/>
+                <a:p>
+                  <a:r>
+                    <a:rPr lang="en-US" dirty="0"/>
+                    <a:t>y</a:t>
+                  </a:r>
+                  <a:r>
+                    <a:rPr lang="en-US" baseline="-25000" dirty="0"/>
+                    <a:t>i+1</a:t>
+                  </a:r>
+                </a:p>
+              </p:txBody>
+            </p:sp>
+            <p:cxnSp>
+              <p:nvCxnSpPr>
+                <p:cNvPr id="36" name="Straight Connector 35"/>
+                <p:cNvCxnSpPr/>
+                <p:nvPr/>
+              </p:nvCxnSpPr>
+              <p:spPr>
+                <a:xfrm>
+                  <a:off x="5250516" y="5425541"/>
+                  <a:ext cx="0" cy="369332"/>
+                </a:xfrm>
+                <a:prstGeom prst="line">
+                  <a:avLst/>
+                </a:prstGeom>
+                <a:ln w="19050">
+                  <a:solidFill>
+                    <a:schemeClr val="tx1"/>
+                  </a:solidFill>
+                </a:ln>
+              </p:spPr>
+              <p:style>
+                <a:lnRef idx="1">
+                  <a:schemeClr val="accent1"/>
+                </a:lnRef>
+                <a:fillRef idx="0">
+                  <a:schemeClr val="accent1"/>
+                </a:fillRef>
+                <a:effectRef idx="0">
+                  <a:schemeClr val="accent1"/>
+                </a:effectRef>
+                <a:fontRef idx="minor">
+                  <a:schemeClr val="tx1"/>
+                </a:fontRef>
+              </p:style>
+            </p:cxnSp>
+            <p:cxnSp>
+              <p:nvCxnSpPr>
+                <p:cNvPr id="37" name="Straight Connector 36"/>
+                <p:cNvCxnSpPr/>
+                <p:nvPr/>
+              </p:nvCxnSpPr>
+              <p:spPr>
+                <a:xfrm>
+                  <a:off x="5847362" y="5424442"/>
+                  <a:ext cx="0" cy="369332"/>
+                </a:xfrm>
+                <a:prstGeom prst="line">
+                  <a:avLst/>
+                </a:prstGeom>
+                <a:ln w="19050">
+                  <a:solidFill>
+                    <a:schemeClr val="tx1"/>
+                  </a:solidFill>
+                </a:ln>
+              </p:spPr>
+              <p:style>
+                <a:lnRef idx="1">
+                  <a:schemeClr val="accent1"/>
+                </a:lnRef>
+                <a:fillRef idx="0">
+                  <a:schemeClr val="accent1"/>
+                </a:fillRef>
+                <a:effectRef idx="0">
+                  <a:schemeClr val="accent1"/>
+                </a:effectRef>
+                <a:fontRef idx="minor">
+                  <a:schemeClr val="tx1"/>
+                </a:fontRef>
+              </p:style>
+            </p:cxnSp>
+            <p:cxnSp>
+              <p:nvCxnSpPr>
+                <p:cNvPr id="38" name="Straight Connector 37"/>
+                <p:cNvCxnSpPr/>
+                <p:nvPr/>
+              </p:nvCxnSpPr>
+              <p:spPr>
+                <a:xfrm>
+                  <a:off x="6423426" y="5424442"/>
+                  <a:ext cx="0" cy="369332"/>
+                </a:xfrm>
+                <a:prstGeom prst="line">
+                  <a:avLst/>
+                </a:prstGeom>
+                <a:ln w="19050">
+                  <a:solidFill>
+                    <a:schemeClr val="tx1"/>
+                  </a:solidFill>
+                </a:ln>
+              </p:spPr>
+              <p:style>
+                <a:lnRef idx="1">
+                  <a:schemeClr val="accent1"/>
+                </a:lnRef>
+                <a:fillRef idx="0">
+                  <a:schemeClr val="accent1"/>
+                </a:fillRef>
+                <a:effectRef idx="0">
+                  <a:schemeClr val="accent1"/>
+                </a:effectRef>
+                <a:fontRef idx="minor">
+                  <a:schemeClr val="tx1"/>
+                </a:fontRef>
+              </p:style>
+            </p:cxnSp>
+            <p:cxnSp>
+              <p:nvCxnSpPr>
+                <p:cNvPr id="39" name="Straight Connector 38"/>
+                <p:cNvCxnSpPr/>
+                <p:nvPr/>
+              </p:nvCxnSpPr>
+              <p:spPr>
+                <a:xfrm>
+                  <a:off x="4695234" y="5434833"/>
+                  <a:ext cx="0" cy="369332"/>
+                </a:xfrm>
+                <a:prstGeom prst="line">
+                  <a:avLst/>
+                </a:prstGeom>
+                <a:ln w="19050">
+                  <a:solidFill>
+                    <a:schemeClr val="tx1"/>
+                  </a:solidFill>
+                </a:ln>
+              </p:spPr>
+              <p:style>
+                <a:lnRef idx="1">
+                  <a:schemeClr val="accent1"/>
+                </a:lnRef>
+                <a:fillRef idx="0">
+                  <a:schemeClr val="accent1"/>
+                </a:fillRef>
+                <a:effectRef idx="0">
+                  <a:schemeClr val="accent1"/>
+                </a:effectRef>
+                <a:fontRef idx="minor">
+                  <a:schemeClr val="tx1"/>
+                </a:fontRef>
+              </p:style>
+            </p:cxnSp>
+            <p:cxnSp>
+              <p:nvCxnSpPr>
+                <p:cNvPr id="40" name="Straight Connector 39"/>
+                <p:cNvCxnSpPr/>
+                <p:nvPr/>
+              </p:nvCxnSpPr>
+              <p:spPr>
+                <a:xfrm>
+                  <a:off x="7061107" y="5424442"/>
+                  <a:ext cx="0" cy="369332"/>
+                </a:xfrm>
+                <a:prstGeom prst="line">
+                  <a:avLst/>
+                </a:prstGeom>
+                <a:ln w="19050">
+                  <a:solidFill>
+                    <a:schemeClr val="tx1"/>
+                  </a:solidFill>
+                </a:ln>
+              </p:spPr>
+              <p:style>
+                <a:lnRef idx="1">
+                  <a:schemeClr val="accent1"/>
+                </a:lnRef>
+                <a:fillRef idx="0">
+                  <a:schemeClr val="accent1"/>
+                </a:fillRef>
+                <a:effectRef idx="0">
+                  <a:schemeClr val="accent1"/>
+                </a:effectRef>
+                <a:fontRef idx="minor">
+                  <a:schemeClr val="tx1"/>
+                </a:fontRef>
+              </p:style>
+            </p:cxnSp>
+            <p:cxnSp>
+              <p:nvCxnSpPr>
+                <p:cNvPr id="41" name="Straight Connector 40"/>
+                <p:cNvCxnSpPr/>
+                <p:nvPr/>
+              </p:nvCxnSpPr>
+              <p:spPr>
+                <a:xfrm>
+                  <a:off x="7647562" y="5424442"/>
+                  <a:ext cx="0" cy="369332"/>
+                </a:xfrm>
+                <a:prstGeom prst="line">
+                  <a:avLst/>
+                </a:prstGeom>
+                <a:ln w="19050">
+                  <a:solidFill>
+                    <a:schemeClr val="tx1"/>
+                  </a:solidFill>
+                </a:ln>
+              </p:spPr>
+              <p:style>
+                <a:lnRef idx="1">
+                  <a:schemeClr val="accent1"/>
+                </a:lnRef>
+                <a:fillRef idx="0">
+                  <a:schemeClr val="accent1"/>
+                </a:fillRef>
+                <a:effectRef idx="0">
+                  <a:schemeClr val="accent1"/>
+                </a:effectRef>
+                <a:fontRef idx="minor">
+                  <a:schemeClr val="tx1"/>
+                </a:fontRef>
+              </p:style>
+            </p:cxnSp>
+            <p:cxnSp>
+              <p:nvCxnSpPr>
+                <p:cNvPr id="42" name="Straight Connector 41"/>
+                <p:cNvCxnSpPr/>
+                <p:nvPr/>
+              </p:nvCxnSpPr>
+              <p:spPr>
+                <a:xfrm>
+                  <a:off x="8254070" y="5435932"/>
+                  <a:ext cx="0" cy="369332"/>
+                </a:xfrm>
+                <a:prstGeom prst="line">
+                  <a:avLst/>
+                </a:prstGeom>
+                <a:ln w="19050">
+                  <a:solidFill>
+                    <a:schemeClr val="tx1"/>
+                  </a:solidFill>
+                </a:ln>
+              </p:spPr>
+              <p:style>
+                <a:lnRef idx="1">
+                  <a:schemeClr val="accent1"/>
+                </a:lnRef>
+                <a:fillRef idx="0">
+                  <a:schemeClr val="accent1"/>
+                </a:fillRef>
+                <a:effectRef idx="0">
+                  <a:schemeClr val="accent1"/>
+                </a:effectRef>
+                <a:fontRef idx="minor">
+                  <a:schemeClr val="tx1"/>
+                </a:fontRef>
+              </p:style>
+            </p:cxnSp>
+            <p:cxnSp>
+              <p:nvCxnSpPr>
+                <p:cNvPr id="43" name="Straight Connector 42"/>
+                <p:cNvCxnSpPr/>
+                <p:nvPr/>
+              </p:nvCxnSpPr>
+              <p:spPr>
+                <a:xfrm>
+                  <a:off x="4047162" y="5434833"/>
+                  <a:ext cx="4896544" cy="0"/>
+                </a:xfrm>
+                <a:prstGeom prst="line">
+                  <a:avLst/>
+                </a:prstGeom>
+                <a:ln w="19050">
+                  <a:solidFill>
+                    <a:schemeClr val="tx1"/>
+                  </a:solidFill>
+                </a:ln>
+              </p:spPr>
+              <p:style>
+                <a:lnRef idx="1">
+                  <a:schemeClr val="accent1"/>
+                </a:lnRef>
+                <a:fillRef idx="0">
+                  <a:schemeClr val="accent1"/>
+                </a:fillRef>
+                <a:effectRef idx="0">
+                  <a:schemeClr val="accent1"/>
+                </a:effectRef>
+                <a:fontRef idx="minor">
+                  <a:schemeClr val="tx1"/>
+                </a:fontRef>
+              </p:style>
+            </p:cxnSp>
+            <p:cxnSp>
+              <p:nvCxnSpPr>
+                <p:cNvPr id="44" name="Straight Connector 43"/>
+                <p:cNvCxnSpPr/>
+                <p:nvPr/>
+              </p:nvCxnSpPr>
+              <p:spPr>
+                <a:xfrm>
+                  <a:off x="4067944" y="5805264"/>
+                  <a:ext cx="4896544" cy="0"/>
+                </a:xfrm>
+                <a:prstGeom prst="line">
+                  <a:avLst/>
+                </a:prstGeom>
+                <a:ln w="19050">
+                  <a:solidFill>
+                    <a:schemeClr val="tx1"/>
+                  </a:solidFill>
+                </a:ln>
+              </p:spPr>
+              <p:style>
+                <a:lnRef idx="1">
+                  <a:schemeClr val="accent1"/>
+                </a:lnRef>
+                <a:fillRef idx="0">
+                  <a:schemeClr val="accent1"/>
+                </a:fillRef>
+                <a:effectRef idx="0">
+                  <a:schemeClr val="accent1"/>
+                </a:effectRef>
+                <a:fontRef idx="minor">
+                  <a:schemeClr val="tx1"/>
+                </a:fontRef>
+              </p:style>
+            </p:cxnSp>
+            <p:sp>
+              <p:nvSpPr>
+                <p:cNvPr id="45" name="TextBox 44"/>
+                <p:cNvSpPr txBox="1"/>
+                <p:nvPr/>
+              </p:nvSpPr>
+              <p:spPr>
+                <a:xfrm>
+                  <a:off x="8456326" y="5393998"/>
+                  <a:ext cx="343364" cy="369332"/>
+                </a:xfrm>
+                <a:prstGeom prst="rect">
+                  <a:avLst/>
+                </a:prstGeom>
+                <a:noFill/>
+              </p:spPr>
+              <p:txBody>
+                <a:bodyPr wrap="none" rtlCol="0">
+                  <a:spAutoFit/>
+                </a:bodyPr>
+                <a:lstStyle/>
+                <a:p>
+                  <a:r>
+                    <a:rPr lang="en-US" dirty="0"/>
+                    <a:t>…</a:t>
+                  </a:r>
+                </a:p>
+              </p:txBody>
+            </p:sp>
+            <p:sp>
+              <p:nvSpPr>
+                <p:cNvPr id="46" name="TextBox 45"/>
+                <p:cNvSpPr txBox="1"/>
+                <p:nvPr/>
+              </p:nvSpPr>
+              <p:spPr>
+                <a:xfrm>
+                  <a:off x="4191178" y="5393998"/>
+                  <a:ext cx="343364" cy="369332"/>
+                </a:xfrm>
+                <a:prstGeom prst="rect">
+                  <a:avLst/>
+                </a:prstGeom>
+                <a:noFill/>
+              </p:spPr>
+              <p:txBody>
+                <a:bodyPr wrap="none" rtlCol="0">
+                  <a:spAutoFit/>
+                </a:bodyPr>
+                <a:lstStyle/>
+                <a:p>
+                  <a:r>
+                    <a:rPr lang="en-US" dirty="0"/>
+                    <a:t>…</a:t>
+                  </a:r>
+                </a:p>
+              </p:txBody>
+            </p:sp>
+          </p:grpSp>
+          <p:grpSp>
+            <p:nvGrpSpPr>
+              <p:cNvPr id="53" name="Group 52"/>
+              <p:cNvGrpSpPr/>
+              <p:nvPr/>
+            </p:nvGrpSpPr>
+            <p:grpSpPr>
+              <a:xfrm>
+                <a:off x="4705627" y="5898054"/>
+                <a:ext cx="2026616" cy="483274"/>
+                <a:chOff x="3748741" y="5373216"/>
+                <a:chExt cx="2026616" cy="483274"/>
+              </a:xfrm>
+            </p:grpSpPr>
+            <p:sp>
+              <p:nvSpPr>
+                <p:cNvPr id="54" name="Left Brace 53"/>
+                <p:cNvSpPr/>
+                <p:nvPr/>
+              </p:nvSpPr>
+              <p:spPr>
+                <a:xfrm rot="16200000">
+                  <a:off x="4693398" y="4428559"/>
+                  <a:ext cx="137301" cy="2026616"/>
+                </a:xfrm>
+                <a:prstGeom prst="leftBrace">
+                  <a:avLst/>
+                </a:prstGeom>
+                <a:ln w="19050">
+                  <a:solidFill>
+                    <a:schemeClr val="tx1"/>
+                  </a:solidFill>
+                </a:ln>
+              </p:spPr>
+              <p:style>
+                <a:lnRef idx="1">
+                  <a:schemeClr val="accent1"/>
+                </a:lnRef>
+                <a:fillRef idx="0">
+                  <a:schemeClr val="accent1"/>
+                </a:fillRef>
+                <a:effectRef idx="0">
+                  <a:schemeClr val="accent1"/>
+                </a:effectRef>
+                <a:fontRef idx="minor">
+                  <a:schemeClr val="tx1"/>
+                </a:fontRef>
+              </p:style>
+              <p:txBody>
+                <a:bodyPr rtlCol="0" anchor="ctr"/>
+                <a:lstStyle/>
+                <a:p>
+                  <a:pPr algn="ctr"/>
+                  <a:endParaRPr lang="en-US"/>
+                </a:p>
+              </p:txBody>
+            </p:sp>
+            <p:sp>
+              <p:nvSpPr>
+                <p:cNvPr id="55" name="TextBox 54"/>
+                <p:cNvSpPr txBox="1"/>
+                <p:nvPr/>
+              </p:nvSpPr>
+              <p:spPr>
+                <a:xfrm>
+                  <a:off x="4386002" y="5487158"/>
+                  <a:ext cx="1122102" cy="369332"/>
+                </a:xfrm>
+                <a:prstGeom prst="rect">
+                  <a:avLst/>
+                </a:prstGeom>
+                <a:noFill/>
+              </p:spPr>
+              <p:txBody>
+                <a:bodyPr wrap="none" rtlCol="0">
+                  <a:spAutoFit/>
+                </a:bodyPr>
+                <a:lstStyle/>
+                <a:p>
+                  <a:r>
+                    <a:rPr lang="en-US" dirty="0"/>
+                    <a:t>cache line</a:t>
+                  </a:r>
+                </a:p>
+              </p:txBody>
+            </p:sp>
+          </p:grpSp>
+        </p:grpSp>
+        <p:sp>
+          <p:nvSpPr>
+            <p:cNvPr id="56" name="TextBox 55">
+              <a:extLst>
+                <a:ext uri="{FF2B5EF4-FFF2-40B4-BE49-F238E27FC236}">
+                  <a16:creationId xmlns:a16="http://schemas.microsoft.com/office/drawing/2014/main" id="{D7949F79-9430-43D2-AE33-9FB13121126C}"/>
+                </a:ext>
+              </a:extLst>
+            </p:cNvPr>
+            <p:cNvSpPr txBox="1"/>
+            <p:nvPr/>
+          </p:nvSpPr>
+          <p:spPr>
+            <a:xfrm>
+              <a:off x="6584269" y="5301365"/>
+              <a:ext cx="343364" cy="369332"/>
+            </a:xfrm>
+            <a:prstGeom prst="rect">
+              <a:avLst/>
+            </a:prstGeom>
+            <a:noFill/>
+          </p:spPr>
+          <p:txBody>
+            <a:bodyPr wrap="none" rtlCol="0">
+              <a:spAutoFit/>
+            </a:bodyPr>
+            <a:lstStyle/>
+            <a:p>
+              <a:r>
+                <a:rPr lang="en-US" dirty="0"/>
+                <a:t>…</a:t>
+              </a:r>
+            </a:p>
+          </p:txBody>
+        </p:sp>
+      </p:grpSp>
     </p:spTree>
     <p:extLst>
       <p:ext uri="{BB962C8B-B14F-4D97-AF65-F5344CB8AC3E}">
@@ -25655,7 +25665,7 @@
                                           </p:stCondLst>
                                         </p:cTn>
                                         <p:tgtEl>
-                                          <p:spTgt spid="57"/>
+                                          <p:spTgt spid="19"/>
                                         </p:tgtEl>
                                         <p:attrNameLst>
                                           <p:attrName>style.visibility</p:attrName>
@@ -33929,7 +33939,7 @@
           <a:graphicData uri="http://schemas.openxmlformats.org/presentationml/2006/ole">
             <mc:AlternateContent xmlns:mc="http://schemas.openxmlformats.org/markup-compatibility/2006">
               <mc:Choice xmlns:v="urn:schemas-microsoft-com:vml" Requires="v">
-                <p:oleObj spid="_x0000_s3147" name="Equation" r:id="rId3" imgW="965160" imgH="228600" progId="Equation.3">
+                <p:oleObj spid="_x0000_s3149" name="Equation" r:id="rId3" imgW="965160" imgH="228600" progId="Equation.3">
                   <p:embed/>
                 </p:oleObj>
               </mc:Choice>

</xml_diff>

<commit_message>
Add explanation of MESI acronym
</commit_message>
<xml_diff>
--- a/code_optimization.pptx
+++ b/code_optimization.pptx
@@ -1557,7 +1557,7 @@
           <a:p>
             <a:fld id="{2E6AAE95-D4FC-4D00-935A-EAE928727A56}" type="datetimeFigureOut">
               <a:rPr lang="en-US" smtClean="0"/>
-              <a:t>2020-01-28</a:t>
+              <a:t>2020-01-29</a:t>
             </a:fld>
             <a:endParaRPr lang="en-US"/>
           </a:p>
@@ -2089,7 +2089,7 @@
           <a:p>
             <a:fld id="{1CFF3F78-F57F-4409-A41B-5EC46D4F404B}" type="datetime1">
               <a:rPr lang="nl-BE" smtClean="0"/>
-              <a:t>28/01/2020</a:t>
+              <a:t>29/01/2020</a:t>
             </a:fld>
             <a:endParaRPr lang="nl-BE"/>
           </a:p>
@@ -2259,7 +2259,7 @@
           <a:p>
             <a:fld id="{7D029E61-52E3-412C-82EB-2F81B17C0AF1}" type="datetime1">
               <a:rPr lang="nl-BE" smtClean="0"/>
-              <a:t>28/01/2020</a:t>
+              <a:t>29/01/2020</a:t>
             </a:fld>
             <a:endParaRPr lang="nl-BE"/>
           </a:p>
@@ -2439,7 +2439,7 @@
           <a:p>
             <a:fld id="{A83F1CEF-A38E-4001-89C6-F3FC7784F299}" type="datetime1">
               <a:rPr lang="nl-BE" smtClean="0"/>
-              <a:t>28/01/2020</a:t>
+              <a:t>29/01/2020</a:t>
             </a:fld>
             <a:endParaRPr lang="nl-BE"/>
           </a:p>
@@ -2565,7 +2565,7 @@
           <a:p>
             <a:fld id="{1FDE84DB-AADA-4C3F-BF46-CA664A504479}" type="datetime1">
               <a:rPr lang="nl-BE" smtClean="0"/>
-              <a:t>28/01/2020</a:t>
+              <a:t>29/01/2020</a:t>
             </a:fld>
             <a:endParaRPr lang="nl-BE" dirty="0"/>
           </a:p>
@@ -2802,7 +2802,7 @@
           <a:p>
             <a:fld id="{8CD53A43-C15C-4F05-9AD7-DB9DE837084D}" type="datetime1">
               <a:rPr lang="nl-BE" smtClean="0"/>
-              <a:t>28/01/2020</a:t>
+              <a:t>29/01/2020</a:t>
             </a:fld>
             <a:endParaRPr lang="nl-BE"/>
           </a:p>
@@ -3048,7 +3048,7 @@
           <a:p>
             <a:fld id="{8994D238-D949-4AEF-9753-A8B6EFA964A0}" type="datetime1">
               <a:rPr lang="nl-BE" smtClean="0"/>
-              <a:t>28/01/2020</a:t>
+              <a:t>29/01/2020</a:t>
             </a:fld>
             <a:endParaRPr lang="nl-BE"/>
           </a:p>
@@ -3336,7 +3336,7 @@
           <a:p>
             <a:fld id="{4D234023-BF99-4AD0-835E-8125DA2B6664}" type="datetime1">
               <a:rPr lang="nl-BE" smtClean="0"/>
-              <a:t>28/01/2020</a:t>
+              <a:t>29/01/2020</a:t>
             </a:fld>
             <a:endParaRPr lang="nl-BE"/>
           </a:p>
@@ -3758,7 +3758,7 @@
           <a:p>
             <a:fld id="{DB075A73-5C1D-406E-9444-3C5C58580E8E}" type="datetime1">
               <a:rPr lang="nl-BE" smtClean="0"/>
-              <a:t>28/01/2020</a:t>
+              <a:t>29/01/2020</a:t>
             </a:fld>
             <a:endParaRPr lang="nl-BE"/>
           </a:p>
@@ -3876,7 +3876,7 @@
           <a:p>
             <a:fld id="{E111FB2D-2E17-4D8F-A64A-4EB0C3D12494}" type="datetime1">
               <a:rPr lang="nl-BE" smtClean="0"/>
-              <a:t>28/01/2020</a:t>
+              <a:t>29/01/2020</a:t>
             </a:fld>
             <a:endParaRPr lang="nl-BE"/>
           </a:p>
@@ -3971,7 +3971,7 @@
           <a:p>
             <a:fld id="{5BE27D71-2267-4E44-9F33-05B60E5C7D9D}" type="datetime1">
               <a:rPr lang="nl-BE" smtClean="0"/>
-              <a:t>28/01/2020</a:t>
+              <a:t>29/01/2020</a:t>
             </a:fld>
             <a:endParaRPr lang="nl-BE"/>
           </a:p>
@@ -4248,7 +4248,7 @@
           <a:p>
             <a:fld id="{182F587C-96C8-4813-A767-3084061A3229}" type="datetime1">
               <a:rPr lang="nl-BE" smtClean="0"/>
-              <a:t>28/01/2020</a:t>
+              <a:t>29/01/2020</a:t>
             </a:fld>
             <a:endParaRPr lang="nl-BE"/>
           </a:p>
@@ -4501,7 +4501,7 @@
           <a:p>
             <a:fld id="{8B021CF8-BBBB-4DFA-8713-49842AA07274}" type="datetime1">
               <a:rPr lang="nl-BE" smtClean="0"/>
-              <a:t>28/01/2020</a:t>
+              <a:t>29/01/2020</a:t>
             </a:fld>
             <a:endParaRPr lang="nl-BE"/>
           </a:p>
@@ -4714,7 +4714,7 @@
           <a:p>
             <a:fld id="{CDBFABB5-0AB3-4CB6-A705-6887DEB1F9F2}" type="datetime1">
               <a:rPr lang="nl-BE" smtClean="0"/>
-              <a:t>28/01/2020</a:t>
+              <a:t>29/01/2020</a:t>
             </a:fld>
             <a:endParaRPr lang="nl-BE"/>
           </a:p>
@@ -11139,7 +11139,7 @@
           <a:graphicData uri="http://schemas.openxmlformats.org/presentationml/2006/ole">
             <mc:AlternateContent xmlns:mc="http://schemas.openxmlformats.org/markup-compatibility/2006">
               <mc:Choice xmlns:v="urn:schemas-microsoft-com:vml" Requires="v">
-                <p:oleObj spid="_x0000_s1284" name="Equation" r:id="rId3" imgW="812520" imgH="393480" progId="Equation.3">
+                <p:oleObj spid="_x0000_s1286" name="Equation" r:id="rId3" imgW="812520" imgH="393480" progId="Equation.3">
                   <p:embed/>
                 </p:oleObj>
               </mc:Choice>
@@ -11196,7 +11196,7 @@
           <a:graphicData uri="http://schemas.openxmlformats.org/presentationml/2006/ole">
             <mc:AlternateContent xmlns:mc="http://schemas.openxmlformats.org/markup-compatibility/2006">
               <mc:Choice xmlns:v="urn:schemas-microsoft-com:vml" Requires="v">
-                <p:oleObj spid="_x0000_s1285" name="Equation" r:id="rId5" imgW="2489040" imgH="431640" progId="Equation.3">
+                <p:oleObj spid="_x0000_s1287" name="Equation" r:id="rId5" imgW="2489040" imgH="431640" progId="Equation.3">
                   <p:embed/>
                 </p:oleObj>
               </mc:Choice>
@@ -21545,7 +21545,7 @@
           <a:graphicData uri="http://schemas.openxmlformats.org/presentationml/2006/ole">
             <mc:AlternateContent xmlns:mc="http://schemas.openxmlformats.org/markup-compatibility/2006">
               <mc:Choice xmlns:v="urn:schemas-microsoft-com:vml" Requires="v">
-                <p:oleObj spid="_x0000_s2275" name="Equation" r:id="rId3" imgW="1091880" imgH="1041120" progId="Equation.3">
+                <p:oleObj spid="_x0000_s2277" name="Equation" r:id="rId3" imgW="1091880" imgH="1041120" progId="Equation.3">
                   <p:embed/>
                 </p:oleObj>
               </mc:Choice>
@@ -22900,7 +22900,7 @@
           <a:graphicData uri="http://schemas.openxmlformats.org/presentationml/2006/ole">
             <mc:AlternateContent xmlns:mc="http://schemas.openxmlformats.org/markup-compatibility/2006">
               <mc:Choice xmlns:v="urn:schemas-microsoft-com:vml" Requires="v">
-                <p:oleObj spid="_x0000_s2276" name="Equation" r:id="rId5" imgW="1091880" imgH="1041120" progId="Equation.3">
+                <p:oleObj spid="_x0000_s2278" name="Equation" r:id="rId5" imgW="1091880" imgH="1041120" progId="Equation.3">
                   <p:embed/>
                 </p:oleObj>
               </mc:Choice>
@@ -33953,7 +33953,7 @@
           <a:graphicData uri="http://schemas.openxmlformats.org/presentationml/2006/ole">
             <mc:AlternateContent xmlns:mc="http://schemas.openxmlformats.org/markup-compatibility/2006">
               <mc:Choice xmlns:v="urn:schemas-microsoft-com:vml" Requires="v">
-                <p:oleObj spid="_x0000_s3150" name="Equation" r:id="rId3" imgW="965160" imgH="228600" progId="Equation.3">
+                <p:oleObj spid="_x0000_s3151" name="Equation" r:id="rId3" imgW="965160" imgH="228600" progId="Equation.3">
                   <p:embed/>
                 </p:oleObj>
               </mc:Choice>
@@ -37797,7 +37797,7 @@
         <p:spPr>
           <a:xfrm>
             <a:off x="6462283" y="1782295"/>
-            <a:ext cx="2119234" cy="707886"/>
+            <a:ext cx="2332433" cy="1323439"/>
           </a:xfrm>
           <a:prstGeom prst="rect">
             <a:avLst/>
@@ -37822,8 +37822,77 @@
           </a:p>
           <a:p>
             <a:r>
+              <a:rPr lang="en-US" sz="2000" b="1" dirty="0">
+                <a:solidFill>
+                  <a:srgbClr val="FF0000"/>
+                </a:solidFill>
+              </a:rPr>
+              <a:t>MESI</a:t>
+            </a:r>
+            <a:r>
               <a:rPr lang="en-US" sz="2000" dirty="0"/>
-              <a:t>MESI protocol</a:t>
+              <a:t> protocol</a:t>
+            </a:r>
+          </a:p>
+          <a:p>
+            <a:r>
+              <a:rPr lang="en-US" sz="2000" dirty="0"/>
+              <a:t>(</a:t>
+            </a:r>
+            <a:r>
+              <a:rPr lang="en-US" sz="2000" dirty="0">
+                <a:solidFill>
+                  <a:srgbClr val="FF0000"/>
+                </a:solidFill>
+              </a:rPr>
+              <a:t>M</a:t>
+            </a:r>
+            <a:r>
+              <a:rPr lang="en-US" sz="2000" dirty="0"/>
+              <a:t>odified, </a:t>
+            </a:r>
+            <a:r>
+              <a:rPr lang="en-US" sz="2000" dirty="0">
+                <a:solidFill>
+                  <a:srgbClr val="FF0000"/>
+                </a:solidFill>
+              </a:rPr>
+              <a:t>E</a:t>
+            </a:r>
+            <a:r>
+              <a:rPr lang="en-US" sz="2000" dirty="0"/>
+              <a:t>xclusive,</a:t>
+            </a:r>
+            <a:br>
+              <a:rPr lang="en-US" sz="2000" dirty="0"/>
+            </a:br>
+            <a:r>
+              <a:rPr lang="en-US" sz="2000" dirty="0"/>
+              <a:t> </a:t>
+            </a:r>
+            <a:r>
+              <a:rPr lang="en-US" sz="2000" dirty="0">
+                <a:solidFill>
+                  <a:srgbClr val="FF0000"/>
+                </a:solidFill>
+              </a:rPr>
+              <a:t>S</a:t>
+            </a:r>
+            <a:r>
+              <a:rPr lang="en-US" sz="2000" dirty="0"/>
+              <a:t>hared, </a:t>
+            </a:r>
+            <a:r>
+              <a:rPr lang="en-US" sz="2000" dirty="0">
+                <a:solidFill>
+                  <a:srgbClr val="FF0000"/>
+                </a:solidFill>
+              </a:rPr>
+              <a:t>I</a:t>
+            </a:r>
+            <a:r>
+              <a:rPr lang="en-US" sz="2000" dirty="0"/>
+              <a:t>nvalid)</a:t>
             </a:r>
           </a:p>
         </p:txBody>

</xml_diff>

<commit_message>
Add slide on branching and pipelines
</commit_message>
<xml_diff>
--- a/code_optimization.pptx
+++ b/code_optimization.pptx
@@ -1561,7 +1561,7 @@
           <a:p>
             <a:fld id="{2E6AAE95-D4FC-4D00-935A-EAE928727A56}" type="datetimeFigureOut">
               <a:rPr lang="en-US" smtClean="0"/>
-              <a:t>2020-01-29</a:t>
+              <a:t>2020-01-30</a:t>
             </a:fld>
             <a:endParaRPr lang="en-US"/>
           </a:p>
@@ -2093,7 +2093,7 @@
           <a:p>
             <a:fld id="{1CFF3F78-F57F-4409-A41B-5EC46D4F404B}" type="datetime1">
               <a:rPr lang="nl-BE" smtClean="0"/>
-              <a:t>29/01/2020</a:t>
+              <a:t>30/01/2020</a:t>
             </a:fld>
             <a:endParaRPr lang="nl-BE"/>
           </a:p>
@@ -2263,7 +2263,7 @@
           <a:p>
             <a:fld id="{7D029E61-52E3-412C-82EB-2F81B17C0AF1}" type="datetime1">
               <a:rPr lang="nl-BE" smtClean="0"/>
-              <a:t>29/01/2020</a:t>
+              <a:t>30/01/2020</a:t>
             </a:fld>
             <a:endParaRPr lang="nl-BE"/>
           </a:p>
@@ -2443,7 +2443,7 @@
           <a:p>
             <a:fld id="{A83F1CEF-A38E-4001-89C6-F3FC7784F299}" type="datetime1">
               <a:rPr lang="nl-BE" smtClean="0"/>
-              <a:t>29/01/2020</a:t>
+              <a:t>30/01/2020</a:t>
             </a:fld>
             <a:endParaRPr lang="nl-BE"/>
           </a:p>
@@ -2569,7 +2569,7 @@
           <a:p>
             <a:fld id="{1FDE84DB-AADA-4C3F-BF46-CA664A504479}" type="datetime1">
               <a:rPr lang="nl-BE" smtClean="0"/>
-              <a:t>29/01/2020</a:t>
+              <a:t>30/01/2020</a:t>
             </a:fld>
             <a:endParaRPr lang="nl-BE" dirty="0"/>
           </a:p>
@@ -2806,7 +2806,7 @@
           <a:p>
             <a:fld id="{8CD53A43-C15C-4F05-9AD7-DB9DE837084D}" type="datetime1">
               <a:rPr lang="nl-BE" smtClean="0"/>
-              <a:t>29/01/2020</a:t>
+              <a:t>30/01/2020</a:t>
             </a:fld>
             <a:endParaRPr lang="nl-BE"/>
           </a:p>
@@ -3052,7 +3052,7 @@
           <a:p>
             <a:fld id="{8994D238-D949-4AEF-9753-A8B6EFA964A0}" type="datetime1">
               <a:rPr lang="nl-BE" smtClean="0"/>
-              <a:t>29/01/2020</a:t>
+              <a:t>30/01/2020</a:t>
             </a:fld>
             <a:endParaRPr lang="nl-BE"/>
           </a:p>
@@ -3340,7 +3340,7 @@
           <a:p>
             <a:fld id="{4D234023-BF99-4AD0-835E-8125DA2B6664}" type="datetime1">
               <a:rPr lang="nl-BE" smtClean="0"/>
-              <a:t>29/01/2020</a:t>
+              <a:t>30/01/2020</a:t>
             </a:fld>
             <a:endParaRPr lang="nl-BE"/>
           </a:p>
@@ -3762,7 +3762,7 @@
           <a:p>
             <a:fld id="{DB075A73-5C1D-406E-9444-3C5C58580E8E}" type="datetime1">
               <a:rPr lang="nl-BE" smtClean="0"/>
-              <a:t>29/01/2020</a:t>
+              <a:t>30/01/2020</a:t>
             </a:fld>
             <a:endParaRPr lang="nl-BE"/>
           </a:p>
@@ -3880,7 +3880,7 @@
           <a:p>
             <a:fld id="{E111FB2D-2E17-4D8F-A64A-4EB0C3D12494}" type="datetime1">
               <a:rPr lang="nl-BE" smtClean="0"/>
-              <a:t>29/01/2020</a:t>
+              <a:t>30/01/2020</a:t>
             </a:fld>
             <a:endParaRPr lang="nl-BE"/>
           </a:p>
@@ -3975,7 +3975,7 @@
           <a:p>
             <a:fld id="{5BE27D71-2267-4E44-9F33-05B60E5C7D9D}" type="datetime1">
               <a:rPr lang="nl-BE" smtClean="0"/>
-              <a:t>29/01/2020</a:t>
+              <a:t>30/01/2020</a:t>
             </a:fld>
             <a:endParaRPr lang="nl-BE"/>
           </a:p>
@@ -4252,7 +4252,7 @@
           <a:p>
             <a:fld id="{182F587C-96C8-4813-A767-3084061A3229}" type="datetime1">
               <a:rPr lang="nl-BE" smtClean="0"/>
-              <a:t>29/01/2020</a:t>
+              <a:t>30/01/2020</a:t>
             </a:fld>
             <a:endParaRPr lang="nl-BE"/>
           </a:p>
@@ -4505,7 +4505,7 @@
           <a:p>
             <a:fld id="{8B021CF8-BBBB-4DFA-8713-49842AA07274}" type="datetime1">
               <a:rPr lang="nl-BE" smtClean="0"/>
-              <a:t>29/01/2020</a:t>
+              <a:t>30/01/2020</a:t>
             </a:fld>
             <a:endParaRPr lang="nl-BE"/>
           </a:p>
@@ -4718,7 +4718,7 @@
           <a:p>
             <a:fld id="{CDBFABB5-0AB3-4CB6-A705-6887DEB1F9F2}" type="datetime1">
               <a:rPr lang="nl-BE" smtClean="0"/>
-              <a:t>29/01/2020</a:t>
+              <a:t>30/01/2020</a:t>
             </a:fld>
             <a:endParaRPr lang="nl-BE"/>
           </a:p>
@@ -11143,7 +11143,7 @@
           <a:graphicData uri="http://schemas.openxmlformats.org/presentationml/2006/ole">
             <mc:AlternateContent xmlns:mc="http://schemas.openxmlformats.org/markup-compatibility/2006">
               <mc:Choice xmlns:v="urn:schemas-microsoft-com:vml" Requires="v">
-                <p:oleObj spid="_x0000_s1290" name="Equation" r:id="rId3" imgW="812520" imgH="393480" progId="Equation.3">
+                <p:oleObj spid="_x0000_s1294" name="Equation" r:id="rId3" imgW="812520" imgH="393480" progId="Equation.3">
                   <p:embed/>
                 </p:oleObj>
               </mc:Choice>
@@ -11200,7 +11200,7 @@
           <a:graphicData uri="http://schemas.openxmlformats.org/presentationml/2006/ole">
             <mc:AlternateContent xmlns:mc="http://schemas.openxmlformats.org/markup-compatibility/2006">
               <mc:Choice xmlns:v="urn:schemas-microsoft-com:vml" Requires="v">
-                <p:oleObj spid="_x0000_s1291" name="Equation" r:id="rId5" imgW="2489040" imgH="431640" progId="Equation.3">
+                <p:oleObj spid="_x0000_s1295" name="Equation" r:id="rId5" imgW="2489040" imgH="431640" progId="Equation.3">
                   <p:embed/>
                 </p:oleObj>
               </mc:Choice>
@@ -21549,7 +21549,7 @@
           <a:graphicData uri="http://schemas.openxmlformats.org/presentationml/2006/ole">
             <mc:AlternateContent xmlns:mc="http://schemas.openxmlformats.org/markup-compatibility/2006">
               <mc:Choice xmlns:v="urn:schemas-microsoft-com:vml" Requires="v">
-                <p:oleObj spid="_x0000_s2281" name="Equation" r:id="rId3" imgW="1091880" imgH="1041120" progId="Equation.3">
+                <p:oleObj spid="_x0000_s2285" name="Equation" r:id="rId3" imgW="1091880" imgH="1041120" progId="Equation.3">
                   <p:embed/>
                 </p:oleObj>
               </mc:Choice>
@@ -22904,7 +22904,7 @@
           <a:graphicData uri="http://schemas.openxmlformats.org/presentationml/2006/ole">
             <mc:AlternateContent xmlns:mc="http://schemas.openxmlformats.org/markup-compatibility/2006">
               <mc:Choice xmlns:v="urn:schemas-microsoft-com:vml" Requires="v">
-                <p:oleObj spid="_x0000_s2282" name="Equation" r:id="rId5" imgW="1091880" imgH="1041120" progId="Equation.3">
+                <p:oleObj spid="_x0000_s2286" name="Equation" r:id="rId5" imgW="1091880" imgH="1041120" progId="Equation.3">
                   <p:embed/>
                 </p:oleObj>
               </mc:Choice>
@@ -36440,7 +36440,7 @@
           <a:graphicData uri="http://schemas.openxmlformats.org/presentationml/2006/ole">
             <mc:AlternateContent xmlns:mc="http://schemas.openxmlformats.org/markup-compatibility/2006">
               <mc:Choice xmlns:v="urn:schemas-microsoft-com:vml" Requires="v">
-                <p:oleObj spid="_x0000_s3153" name="Equation" r:id="rId3" imgW="965160" imgH="228600" progId="Equation.3">
+                <p:oleObj spid="_x0000_s3155" name="Equation" r:id="rId3" imgW="965160" imgH="228600" progId="Equation.3">
                   <p:embed/>
                 </p:oleObj>
               </mc:Choice>
@@ -36882,7 +36882,7 @@
           <a:p>
             <a:r>
               <a:rPr lang="en-US" dirty="0"/>
-              <a:t>Branch prediction</a:t>
+              <a:t>Branches</a:t>
             </a:r>
             <a:endParaRPr lang="en-BE" dirty="0"/>
           </a:p>
@@ -36916,13 +36916,27 @@
           <a:p>
             <a:r>
               <a:rPr lang="en-US" dirty="0"/>
-              <a:t>Compute is pipelined</a:t>
+              <a:t>Calculations are pipelined</a:t>
             </a:r>
           </a:p>
           <a:p>
             <a:r>
               <a:rPr lang="en-US" dirty="0"/>
-              <a:t>Memory bound: speculative execution</a:t>
+              <a:t>On branch switch</a:t>
+            </a:r>
+          </a:p>
+          <a:p>
+            <a:pPr lvl="1"/>
+            <a:r>
+              <a:rPr lang="en-US" dirty="0"/>
+              <a:t>one pipeline terminates</a:t>
+            </a:r>
+          </a:p>
+          <a:p>
+            <a:pPr lvl="1"/>
+            <a:r>
+              <a:rPr lang="en-US" dirty="0"/>
+              <a:t>other pipeline starts</a:t>
             </a:r>
             <a:endParaRPr lang="en-BE" dirty="0"/>
           </a:p>
@@ -37153,6 +37167,47 @@
               <a:latin typeface="Courier New" panose="02070309020205020404" pitchFamily="49" charset="0"/>
               <a:cs typeface="Courier New" panose="02070309020205020404" pitchFamily="49" charset="0"/>
             </a:endParaRPr>
+          </a:p>
+        </p:txBody>
+      </p:sp>
+      <p:sp>
+        <p:nvSpPr>
+          <p:cNvPr id="5" name="TextBox 4">
+            <a:extLst>
+              <a:ext uri="{FF2B5EF4-FFF2-40B4-BE49-F238E27FC236}">
+                <a16:creationId xmlns:a16="http://schemas.microsoft.com/office/drawing/2014/main" id="{072AF9A2-5548-49B0-8E96-F8396B14491C}"/>
+              </a:ext>
+            </a:extLst>
+          </p:cNvPr>
+          <p:cNvSpPr txBox="1"/>
+          <p:nvPr/>
+        </p:nvSpPr>
+        <p:spPr>
+          <a:xfrm>
+            <a:off x="5868144" y="4797152"/>
+            <a:ext cx="2664296" cy="830997"/>
+          </a:xfrm>
+          <a:prstGeom prst="rect">
+            <a:avLst/>
+          </a:prstGeom>
+          <a:noFill/>
+          <a:ln>
+            <a:solidFill>
+              <a:schemeClr val="tx1"/>
+            </a:solidFill>
+          </a:ln>
+        </p:spPr>
+        <p:txBody>
+          <a:bodyPr wrap="square" rtlCol="0">
+            <a:spAutoFit/>
+          </a:bodyPr>
+          <a:lstStyle/>
+          <a:p>
+            <a:r>
+              <a:rPr lang="en-US" sz="2400" dirty="0"/>
+              <a:t>30 % performance difference</a:t>
+            </a:r>
+            <a:endParaRPr lang="en-BE" sz="2400" dirty="0"/>
           </a:p>
         </p:txBody>
       </p:sp>
@@ -37222,6 +37277,211 @@
                       </p:childTnLst>
                     </p:cTn>
                   </p:par>
+                  <p:par>
+                    <p:cTn id="7" fill="hold">
+                      <p:stCondLst>
+                        <p:cond delay="indefinite"/>
+                      </p:stCondLst>
+                      <p:childTnLst>
+                        <p:par>
+                          <p:cTn id="8" fill="hold">
+                            <p:stCondLst>
+                              <p:cond delay="0"/>
+                            </p:stCondLst>
+                            <p:childTnLst>
+                              <p:par>
+                                <p:cTn id="9" presetID="1" presetClass="entr" presetSubtype="0" fill="hold" grpId="0" nodeType="clickEffect">
+                                  <p:stCondLst>
+                                    <p:cond delay="0"/>
+                                  </p:stCondLst>
+                                  <p:childTnLst>
+                                    <p:set>
+                                      <p:cBhvr>
+                                        <p:cTn id="10" dur="1" fill="hold">
+                                          <p:stCondLst>
+                                            <p:cond delay="0"/>
+                                          </p:stCondLst>
+                                        </p:cTn>
+                                        <p:tgtEl>
+                                          <p:spTgt spid="3">
+                                            <p:txEl>
+                                              <p:pRg st="0" end="0"/>
+                                            </p:txEl>
+                                          </p:spTgt>
+                                        </p:tgtEl>
+                                        <p:attrNameLst>
+                                          <p:attrName>style.visibility</p:attrName>
+                                        </p:attrNameLst>
+                                      </p:cBhvr>
+                                      <p:to>
+                                        <p:strVal val="visible"/>
+                                      </p:to>
+                                    </p:set>
+                                  </p:childTnLst>
+                                </p:cTn>
+                              </p:par>
+                            </p:childTnLst>
+                          </p:cTn>
+                        </p:par>
+                      </p:childTnLst>
+                    </p:cTn>
+                  </p:par>
+                  <p:par>
+                    <p:cTn id="11" fill="hold">
+                      <p:stCondLst>
+                        <p:cond delay="indefinite"/>
+                      </p:stCondLst>
+                      <p:childTnLst>
+                        <p:par>
+                          <p:cTn id="12" fill="hold">
+                            <p:stCondLst>
+                              <p:cond delay="0"/>
+                            </p:stCondLst>
+                            <p:childTnLst>
+                              <p:par>
+                                <p:cTn id="13" presetID="1" presetClass="entr" presetSubtype="0" fill="hold" grpId="0" nodeType="clickEffect">
+                                  <p:stCondLst>
+                                    <p:cond delay="0"/>
+                                  </p:stCondLst>
+                                  <p:childTnLst>
+                                    <p:set>
+                                      <p:cBhvr>
+                                        <p:cTn id="14" dur="1" fill="hold">
+                                          <p:stCondLst>
+                                            <p:cond delay="0"/>
+                                          </p:stCondLst>
+                                        </p:cTn>
+                                        <p:tgtEl>
+                                          <p:spTgt spid="3">
+                                            <p:txEl>
+                                              <p:pRg st="1" end="1"/>
+                                            </p:txEl>
+                                          </p:spTgt>
+                                        </p:tgtEl>
+                                        <p:attrNameLst>
+                                          <p:attrName>style.visibility</p:attrName>
+                                        </p:attrNameLst>
+                                      </p:cBhvr>
+                                      <p:to>
+                                        <p:strVal val="visible"/>
+                                      </p:to>
+                                    </p:set>
+                                  </p:childTnLst>
+                                </p:cTn>
+                              </p:par>
+                              <p:par>
+                                <p:cTn id="15" presetID="1" presetClass="entr" presetSubtype="0" fill="hold" grpId="0" nodeType="withEffect">
+                                  <p:stCondLst>
+                                    <p:cond delay="0"/>
+                                  </p:stCondLst>
+                                  <p:childTnLst>
+                                    <p:set>
+                                      <p:cBhvr>
+                                        <p:cTn id="16" dur="1" fill="hold">
+                                          <p:stCondLst>
+                                            <p:cond delay="0"/>
+                                          </p:stCondLst>
+                                        </p:cTn>
+                                        <p:tgtEl>
+                                          <p:spTgt spid="3">
+                                            <p:txEl>
+                                              <p:pRg st="2" end="2"/>
+                                            </p:txEl>
+                                          </p:spTgt>
+                                        </p:tgtEl>
+                                        <p:attrNameLst>
+                                          <p:attrName>style.visibility</p:attrName>
+                                        </p:attrNameLst>
+                                      </p:cBhvr>
+                                      <p:to>
+                                        <p:strVal val="visible"/>
+                                      </p:to>
+                                    </p:set>
+                                  </p:childTnLst>
+                                </p:cTn>
+                              </p:par>
+                              <p:par>
+                                <p:cTn id="17" presetID="1" presetClass="entr" presetSubtype="0" fill="hold" grpId="0" nodeType="withEffect">
+                                  <p:stCondLst>
+                                    <p:cond delay="0"/>
+                                  </p:stCondLst>
+                                  <p:childTnLst>
+                                    <p:set>
+                                      <p:cBhvr>
+                                        <p:cTn id="18" dur="1" fill="hold">
+                                          <p:stCondLst>
+                                            <p:cond delay="0"/>
+                                          </p:stCondLst>
+                                        </p:cTn>
+                                        <p:tgtEl>
+                                          <p:spTgt spid="3">
+                                            <p:txEl>
+                                              <p:pRg st="3" end="3"/>
+                                            </p:txEl>
+                                          </p:spTgt>
+                                        </p:tgtEl>
+                                        <p:attrNameLst>
+                                          <p:attrName>style.visibility</p:attrName>
+                                        </p:attrNameLst>
+                                      </p:cBhvr>
+                                      <p:to>
+                                        <p:strVal val="visible"/>
+                                      </p:to>
+                                    </p:set>
+                                  </p:childTnLst>
+                                </p:cTn>
+                              </p:par>
+                            </p:childTnLst>
+                          </p:cTn>
+                        </p:par>
+                      </p:childTnLst>
+                    </p:cTn>
+                  </p:par>
+                  <p:par>
+                    <p:cTn id="19" fill="hold">
+                      <p:stCondLst>
+                        <p:cond delay="indefinite"/>
+                      </p:stCondLst>
+                      <p:childTnLst>
+                        <p:par>
+                          <p:cTn id="20" fill="hold">
+                            <p:stCondLst>
+                              <p:cond delay="0"/>
+                            </p:stCondLst>
+                            <p:childTnLst>
+                              <p:par>
+                                <p:cTn id="21" presetID="1" presetClass="entr" presetSubtype="0" fill="hold" grpId="0" nodeType="clickEffect">
+                                  <p:stCondLst>
+                                    <p:cond delay="0"/>
+                                  </p:stCondLst>
+                                  <p:childTnLst>
+                                    <p:set>
+                                      <p:cBhvr>
+                                        <p:cTn id="22" dur="1" fill="hold">
+                                          <p:stCondLst>
+                                            <p:cond delay="0"/>
+                                          </p:stCondLst>
+                                        </p:cTn>
+                                        <p:tgtEl>
+                                          <p:spTgt spid="5"/>
+                                        </p:tgtEl>
+                                        <p:attrNameLst>
+                                          <p:attrName>style.visibility</p:attrName>
+                                        </p:attrNameLst>
+                                      </p:cBhvr>
+                                      <p:to>
+                                        <p:strVal val="visible"/>
+                                      </p:to>
+                                    </p:set>
+                                  </p:childTnLst>
+                                </p:cTn>
+                              </p:par>
+                            </p:childTnLst>
+                          </p:cTn>
+                        </p:par>
+                      </p:childTnLst>
+                    </p:cTn>
+                  </p:par>
                 </p:childTnLst>
               </p:cTn>
               <p:prevCondLst>
@@ -37244,7 +37504,9 @@
       </p:par>
     </p:tnLst>
     <p:bldLst>
+      <p:bldP spid="3" grpId="0" build="p"/>
       <p:bldP spid="6" grpId="0" animBg="1"/>
+      <p:bldP spid="5" grpId="0" animBg="1"/>
     </p:bldLst>
   </p:timing>
 </p:sld>

</xml_diff>

<commit_message>
Fix brand name for MAP, make memory units consistent
</commit_message>
<xml_diff>
--- a/code_optimization.pptx
+++ b/code_optimization.pptx
@@ -1561,7 +1561,7 @@
           <a:p>
             <a:fld id="{2E6AAE95-D4FC-4D00-935A-EAE928727A56}" type="datetimeFigureOut">
               <a:rPr lang="en-US" smtClean="0"/>
-              <a:t>2020-01-30</a:t>
+              <a:t>2021-01-26</a:t>
             </a:fld>
             <a:endParaRPr lang="en-US"/>
           </a:p>
@@ -2093,7 +2093,7 @@
           <a:p>
             <a:fld id="{1CFF3F78-F57F-4409-A41B-5EC46D4F404B}" type="datetime1">
               <a:rPr lang="nl-BE" smtClean="0"/>
-              <a:t>30/01/2020</a:t>
+              <a:t>26/01/2021</a:t>
             </a:fld>
             <a:endParaRPr lang="nl-BE"/>
           </a:p>
@@ -2263,7 +2263,7 @@
           <a:p>
             <a:fld id="{7D029E61-52E3-412C-82EB-2F81B17C0AF1}" type="datetime1">
               <a:rPr lang="nl-BE" smtClean="0"/>
-              <a:t>30/01/2020</a:t>
+              <a:t>26/01/2021</a:t>
             </a:fld>
             <a:endParaRPr lang="nl-BE"/>
           </a:p>
@@ -2443,7 +2443,7 @@
           <a:p>
             <a:fld id="{A83F1CEF-A38E-4001-89C6-F3FC7784F299}" type="datetime1">
               <a:rPr lang="nl-BE" smtClean="0"/>
-              <a:t>30/01/2020</a:t>
+              <a:t>26/01/2021</a:t>
             </a:fld>
             <a:endParaRPr lang="nl-BE"/>
           </a:p>
@@ -2569,7 +2569,7 @@
           <a:p>
             <a:fld id="{1FDE84DB-AADA-4C3F-BF46-CA664A504479}" type="datetime1">
               <a:rPr lang="nl-BE" smtClean="0"/>
-              <a:t>30/01/2020</a:t>
+              <a:t>26/01/2021</a:t>
             </a:fld>
             <a:endParaRPr lang="nl-BE" dirty="0"/>
           </a:p>
@@ -2806,7 +2806,7 @@
           <a:p>
             <a:fld id="{8CD53A43-C15C-4F05-9AD7-DB9DE837084D}" type="datetime1">
               <a:rPr lang="nl-BE" smtClean="0"/>
-              <a:t>30/01/2020</a:t>
+              <a:t>26/01/2021</a:t>
             </a:fld>
             <a:endParaRPr lang="nl-BE"/>
           </a:p>
@@ -3052,7 +3052,7 @@
           <a:p>
             <a:fld id="{8994D238-D949-4AEF-9753-A8B6EFA964A0}" type="datetime1">
               <a:rPr lang="nl-BE" smtClean="0"/>
-              <a:t>30/01/2020</a:t>
+              <a:t>26/01/2021</a:t>
             </a:fld>
             <a:endParaRPr lang="nl-BE"/>
           </a:p>
@@ -3340,7 +3340,7 @@
           <a:p>
             <a:fld id="{4D234023-BF99-4AD0-835E-8125DA2B6664}" type="datetime1">
               <a:rPr lang="nl-BE" smtClean="0"/>
-              <a:t>30/01/2020</a:t>
+              <a:t>26/01/2021</a:t>
             </a:fld>
             <a:endParaRPr lang="nl-BE"/>
           </a:p>
@@ -3762,7 +3762,7 @@
           <a:p>
             <a:fld id="{DB075A73-5C1D-406E-9444-3C5C58580E8E}" type="datetime1">
               <a:rPr lang="nl-BE" smtClean="0"/>
-              <a:t>30/01/2020</a:t>
+              <a:t>26/01/2021</a:t>
             </a:fld>
             <a:endParaRPr lang="nl-BE"/>
           </a:p>
@@ -3880,7 +3880,7 @@
           <a:p>
             <a:fld id="{E111FB2D-2E17-4D8F-A64A-4EB0C3D12494}" type="datetime1">
               <a:rPr lang="nl-BE" smtClean="0"/>
-              <a:t>30/01/2020</a:t>
+              <a:t>26/01/2021</a:t>
             </a:fld>
             <a:endParaRPr lang="nl-BE"/>
           </a:p>
@@ -3975,7 +3975,7 @@
           <a:p>
             <a:fld id="{5BE27D71-2267-4E44-9F33-05B60E5C7D9D}" type="datetime1">
               <a:rPr lang="nl-BE" smtClean="0"/>
-              <a:t>30/01/2020</a:t>
+              <a:t>26/01/2021</a:t>
             </a:fld>
             <a:endParaRPr lang="nl-BE"/>
           </a:p>
@@ -4252,7 +4252,7 @@
           <a:p>
             <a:fld id="{182F587C-96C8-4813-A767-3084061A3229}" type="datetime1">
               <a:rPr lang="nl-BE" smtClean="0"/>
-              <a:t>30/01/2020</a:t>
+              <a:t>26/01/2021</a:t>
             </a:fld>
             <a:endParaRPr lang="nl-BE"/>
           </a:p>
@@ -4505,7 +4505,7 @@
           <a:p>
             <a:fld id="{8B021CF8-BBBB-4DFA-8713-49842AA07274}" type="datetime1">
               <a:rPr lang="nl-BE" smtClean="0"/>
-              <a:t>30/01/2020</a:t>
+              <a:t>26/01/2021</a:t>
             </a:fld>
             <a:endParaRPr lang="nl-BE"/>
           </a:p>
@@ -4718,7 +4718,7 @@
           <a:p>
             <a:fld id="{CDBFABB5-0AB3-4CB6-A705-6887DEB1F9F2}" type="datetime1">
               <a:rPr lang="nl-BE" smtClean="0"/>
-              <a:t>30/01/2020</a:t>
+              <a:t>26/01/2021</a:t>
             </a:fld>
             <a:endParaRPr lang="nl-BE"/>
           </a:p>
@@ -11143,12 +11143,12 @@
           <a:graphicData uri="http://schemas.openxmlformats.org/presentationml/2006/ole">
             <mc:AlternateContent xmlns:mc="http://schemas.openxmlformats.org/markup-compatibility/2006">
               <mc:Choice xmlns:v="urn:schemas-microsoft-com:vml" Requires="v">
-                <p:oleObj spid="_x0000_s1294" name="Equation" r:id="rId3" imgW="812520" imgH="393480" progId="Equation.3">
+                <p:oleObj name="Equation" r:id="rId2" imgW="812520" imgH="393480" progId="Equation.3">
                   <p:embed/>
                 </p:oleObj>
               </mc:Choice>
               <mc:Fallback>
-                <p:oleObj name="Equation" r:id="rId3" imgW="812520" imgH="393480" progId="Equation.3">
+                <p:oleObj name="Equation" r:id="rId2" imgW="812520" imgH="393480" progId="Equation.3">
                   <p:embed/>
                   <p:pic>
                     <p:nvPicPr>
@@ -11157,7 +11157,7 @@
                       <p:nvPr/>
                     </p:nvPicPr>
                     <p:blipFill>
-                      <a:blip r:embed="rId4"/>
+                      <a:blip r:embed="rId3"/>
                       <a:stretch>
                         <a:fillRect/>
                       </a:stretch>
@@ -11200,12 +11200,12 @@
           <a:graphicData uri="http://schemas.openxmlformats.org/presentationml/2006/ole">
             <mc:AlternateContent xmlns:mc="http://schemas.openxmlformats.org/markup-compatibility/2006">
               <mc:Choice xmlns:v="urn:schemas-microsoft-com:vml" Requires="v">
-                <p:oleObj spid="_x0000_s1295" name="Equation" r:id="rId5" imgW="2489040" imgH="431640" progId="Equation.3">
+                <p:oleObj name="Equation" r:id="rId4" imgW="2489040" imgH="431640" progId="Equation.3">
                   <p:embed/>
                 </p:oleObj>
               </mc:Choice>
               <mc:Fallback>
-                <p:oleObj name="Equation" r:id="rId5" imgW="2489040" imgH="431640" progId="Equation.3">
+                <p:oleObj name="Equation" r:id="rId4" imgW="2489040" imgH="431640" progId="Equation.3">
                   <p:embed/>
                   <p:pic>
                     <p:nvPicPr>
@@ -11214,7 +11214,7 @@
                       <p:nvPr/>
                     </p:nvPicPr>
                     <p:blipFill>
-                      <a:blip r:embed="rId6"/>
+                      <a:blip r:embed="rId5"/>
                       <a:stretch>
                         <a:fillRect/>
                       </a:stretch>
@@ -17046,7 +17046,15 @@
             <a:pPr lvl="1"/>
             <a:r>
               <a:rPr lang="en-US" dirty="0"/>
-              <a:t>size: 256 kb</a:t>
+              <a:t>size: 256 kB, for </a:t>
+            </a:r>
+            <a:r>
+              <a:rPr lang="en-US" dirty="0" err="1"/>
+              <a:t>skylake</a:t>
+            </a:r>
+            <a:r>
+              <a:rPr lang="en-US" dirty="0"/>
+              <a:t> and later: 1 MB</a:t>
             </a:r>
           </a:p>
           <a:p>
@@ -17066,7 +17074,7 @@
             <a:pPr lvl="1"/>
             <a:r>
               <a:rPr lang="en-US" dirty="0"/>
-              <a:t>size: 32 kb data + 32 kb instruction</a:t>
+              <a:t>size: 32 kB data + 32 kB instruction</a:t>
             </a:r>
           </a:p>
           <a:p>
@@ -21549,12 +21557,12 @@
           <a:graphicData uri="http://schemas.openxmlformats.org/presentationml/2006/ole">
             <mc:AlternateContent xmlns:mc="http://schemas.openxmlformats.org/markup-compatibility/2006">
               <mc:Choice xmlns:v="urn:schemas-microsoft-com:vml" Requires="v">
-                <p:oleObj spid="_x0000_s2285" name="Equation" r:id="rId3" imgW="1091880" imgH="1041120" progId="Equation.3">
+                <p:oleObj name="Equation" r:id="rId2" imgW="1091880" imgH="1041120" progId="Equation.3">
                   <p:embed/>
                 </p:oleObj>
               </mc:Choice>
               <mc:Fallback>
-                <p:oleObj name="Equation" r:id="rId3" imgW="1091880" imgH="1041120" progId="Equation.3">
+                <p:oleObj name="Equation" r:id="rId2" imgW="1091880" imgH="1041120" progId="Equation.3">
                   <p:embed/>
                   <p:pic>
                     <p:nvPicPr>
@@ -21563,7 +21571,7 @@
                       <p:nvPr/>
                     </p:nvPicPr>
                     <p:blipFill>
-                      <a:blip r:embed="rId4"/>
+                      <a:blip r:embed="rId3"/>
                       <a:stretch>
                         <a:fillRect/>
                       </a:stretch>
@@ -22904,12 +22912,12 @@
           <a:graphicData uri="http://schemas.openxmlformats.org/presentationml/2006/ole">
             <mc:AlternateContent xmlns:mc="http://schemas.openxmlformats.org/markup-compatibility/2006">
               <mc:Choice xmlns:v="urn:schemas-microsoft-com:vml" Requires="v">
-                <p:oleObj spid="_x0000_s2286" name="Equation" r:id="rId5" imgW="1091880" imgH="1041120" progId="Equation.3">
+                <p:oleObj name="Equation" r:id="rId4" imgW="1091880" imgH="1041120" progId="Equation.3">
                   <p:embed/>
                 </p:oleObj>
               </mc:Choice>
               <mc:Fallback>
-                <p:oleObj name="Equation" r:id="rId5" imgW="1091880" imgH="1041120" progId="Equation.3">
+                <p:oleObj name="Equation" r:id="rId4" imgW="1091880" imgH="1041120" progId="Equation.3">
                   <p:embed/>
                   <p:pic>
                     <p:nvPicPr>
@@ -22918,7 +22926,7 @@
                       <p:nvPr/>
                     </p:nvPicPr>
                     <p:blipFill>
-                      <a:blip r:embed="rId4"/>
+                      <a:blip r:embed="rId3"/>
                       <a:stretch>
                         <a:fillRect/>
                       </a:stretch>
@@ -25782,7 +25790,7 @@
           <a:p>
             <a:r>
               <a:rPr lang="en-US" dirty="0"/>
-              <a:t>L2: 8-way associative, 256 kb</a:t>
+              <a:t>L2: 8-way associative, 256 kB</a:t>
             </a:r>
           </a:p>
           <a:p>
@@ -27581,8 +27589,8 @@
         </p:nvSpPr>
         <p:spPr>
           <a:xfrm>
-            <a:off x="107504" y="5229200"/>
-            <a:ext cx="9355574" cy="830997"/>
+            <a:off x="179512" y="5229200"/>
+            <a:ext cx="8733302" cy="830997"/>
           </a:xfrm>
           <a:prstGeom prst="rect">
             <a:avLst/>
@@ -27590,7 +27598,7 @@
           <a:noFill/>
         </p:spPr>
         <p:txBody>
-          <a:bodyPr wrap="none" rtlCol="0">
+          <a:bodyPr wrap="square" rtlCol="0">
             <a:spAutoFit/>
           </a:bodyPr>
           <a:lstStyle/>
@@ -27605,46 +27613,30 @@
             </a:r>
             <a:r>
               <a:rPr lang="en-US" sz="2400" dirty="0"/>
-              <a:t>/register  </a:t>
-            </a:r>
-            <a:r>
-              <a:rPr lang="en-US" sz="2400"/>
-              <a:t>× 2.4</a:t>
-            </a:r>
-            <a:r>
-              <a:rPr lang="en-US" sz="2400" baseline="30000"/>
+              <a:t>/register  × 2.4</a:t>
+            </a:r>
+            <a:r>
+              <a:rPr lang="en-US" sz="2400" baseline="30000" dirty="0"/>
               <a:t>.</a:t>
             </a:r>
             <a:r>
-              <a:rPr lang="en-US" sz="2400"/>
+              <a:rPr lang="en-US" sz="2400" dirty="0"/>
               <a:t>10</a:t>
             </a:r>
             <a:r>
-              <a:rPr lang="en-US" sz="2400" baseline="30000"/>
+              <a:rPr lang="en-US" sz="2400" baseline="30000" dirty="0"/>
               <a:t>9</a:t>
             </a:r>
             <a:r>
-              <a:rPr lang="en-US" sz="2400"/>
-              <a:t> </a:t>
-            </a:r>
-            <a:r>
               <a:rPr lang="en-US" sz="2400" dirty="0"/>
-              <a:t>additions × 14 cores × 2 sockets</a:t>
+              <a:t> ops. × 14 cores × 2 sockets</a:t>
             </a:r>
             <a:br>
               <a:rPr lang="en-US" sz="2400" dirty="0"/>
             </a:br>
             <a:r>
               <a:rPr lang="en-US" sz="2400" dirty="0"/>
-              <a:t>                                </a:t>
-            </a:r>
-            <a:r>
-              <a:rPr lang="en-US" sz="2400"/>
-              <a:t>= 269 </a:t>
-            </a:r>
-            <a:r>
-              <a:rPr lang="en-US" sz="2400" dirty="0"/>
-              <a:t>GFLOPS</a:t>
+              <a:t>                                = 269 GFLOPS</a:t>
             </a:r>
           </a:p>
         </p:txBody>
@@ -36440,12 +36432,12 @@
           <a:graphicData uri="http://schemas.openxmlformats.org/presentationml/2006/ole">
             <mc:AlternateContent xmlns:mc="http://schemas.openxmlformats.org/markup-compatibility/2006">
               <mc:Choice xmlns:v="urn:schemas-microsoft-com:vml" Requires="v">
-                <p:oleObj spid="_x0000_s3155" name="Equation" r:id="rId3" imgW="965160" imgH="228600" progId="Equation.3">
+                <p:oleObj name="Equation" r:id="rId2" imgW="965160" imgH="228600" progId="Equation.3">
                   <p:embed/>
                 </p:oleObj>
               </mc:Choice>
               <mc:Fallback>
-                <p:oleObj name="Equation" r:id="rId3" imgW="965160" imgH="228600" progId="Equation.3">
+                <p:oleObj name="Equation" r:id="rId2" imgW="965160" imgH="228600" progId="Equation.3">
                   <p:embed/>
                   <p:pic>
                     <p:nvPicPr>
@@ -36454,7 +36446,7 @@
                       <p:nvPr/>
                     </p:nvPicPr>
                     <p:blipFill>
-                      <a:blip r:embed="rId4"/>
+                      <a:blip r:embed="rId3"/>
                       <a:stretch>
                         <a:fillRect/>
                       </a:stretch>
@@ -47516,7 +47508,7 @@
             <a:pPr lvl="1"/>
             <a:r>
               <a:rPr lang="en-US" dirty="0" err="1"/>
-              <a:t>AllineaForge</a:t>
+              <a:t>ArmForge</a:t>
             </a:r>
             <a:r>
               <a:rPr lang="en-US" dirty="0"/>

</xml_diff>

<commit_message>
Add VSC & EuroCC logos & fix typo
</commit_message>
<xml_diff>
--- a/code_optimization.pptx
+++ b/code_optimization.pptx
@@ -1567,7 +1567,7 @@
           <a:p>
             <a:fld id="{2E6AAE95-D4FC-4D00-935A-EAE928727A56}" type="datetimeFigureOut">
               <a:rPr lang="en-US" smtClean="0"/>
-              <a:t>2022-01-27</a:t>
+              <a:t>2023-01-13</a:t>
             </a:fld>
             <a:endParaRPr lang="en-US"/>
           </a:p>
@@ -2099,7 +2099,7 @@
           <a:p>
             <a:fld id="{1CFF3F78-F57F-4409-A41B-5EC46D4F404B}" type="datetime1">
               <a:rPr lang="nl-BE" smtClean="0"/>
-              <a:t>27/01/2022</a:t>
+              <a:t>13/01/2023</a:t>
             </a:fld>
             <a:endParaRPr lang="nl-BE"/>
           </a:p>
@@ -2269,7 +2269,7 @@
           <a:p>
             <a:fld id="{7D029E61-52E3-412C-82EB-2F81B17C0AF1}" type="datetime1">
               <a:rPr lang="nl-BE" smtClean="0"/>
-              <a:t>27/01/2022</a:t>
+              <a:t>13/01/2023</a:t>
             </a:fld>
             <a:endParaRPr lang="nl-BE"/>
           </a:p>
@@ -2449,7 +2449,7 @@
           <a:p>
             <a:fld id="{A83F1CEF-A38E-4001-89C6-F3FC7784F299}" type="datetime1">
               <a:rPr lang="nl-BE" smtClean="0"/>
-              <a:t>27/01/2022</a:t>
+              <a:t>13/01/2023</a:t>
             </a:fld>
             <a:endParaRPr lang="nl-BE"/>
           </a:p>
@@ -2575,7 +2575,7 @@
           <a:p>
             <a:fld id="{1FDE84DB-AADA-4C3F-BF46-CA664A504479}" type="datetime1">
               <a:rPr lang="nl-BE" smtClean="0"/>
-              <a:t>27/01/2022</a:t>
+              <a:t>13/01/2023</a:t>
             </a:fld>
             <a:endParaRPr lang="nl-BE" dirty="0"/>
           </a:p>
@@ -2812,7 +2812,7 @@
           <a:p>
             <a:fld id="{8CD53A43-C15C-4F05-9AD7-DB9DE837084D}" type="datetime1">
               <a:rPr lang="nl-BE" smtClean="0"/>
-              <a:t>27/01/2022</a:t>
+              <a:t>13/01/2023</a:t>
             </a:fld>
             <a:endParaRPr lang="nl-BE"/>
           </a:p>
@@ -3058,7 +3058,7 @@
           <a:p>
             <a:fld id="{8994D238-D949-4AEF-9753-A8B6EFA964A0}" type="datetime1">
               <a:rPr lang="nl-BE" smtClean="0"/>
-              <a:t>27/01/2022</a:t>
+              <a:t>13/01/2023</a:t>
             </a:fld>
             <a:endParaRPr lang="nl-BE"/>
           </a:p>
@@ -3346,7 +3346,7 @@
           <a:p>
             <a:fld id="{4D234023-BF99-4AD0-835E-8125DA2B6664}" type="datetime1">
               <a:rPr lang="nl-BE" smtClean="0"/>
-              <a:t>27/01/2022</a:t>
+              <a:t>13/01/2023</a:t>
             </a:fld>
             <a:endParaRPr lang="nl-BE"/>
           </a:p>
@@ -3768,7 +3768,7 @@
           <a:p>
             <a:fld id="{DB075A73-5C1D-406E-9444-3C5C58580E8E}" type="datetime1">
               <a:rPr lang="nl-BE" smtClean="0"/>
-              <a:t>27/01/2022</a:t>
+              <a:t>13/01/2023</a:t>
             </a:fld>
             <a:endParaRPr lang="nl-BE"/>
           </a:p>
@@ -3886,7 +3886,7 @@
           <a:p>
             <a:fld id="{E111FB2D-2E17-4D8F-A64A-4EB0C3D12494}" type="datetime1">
               <a:rPr lang="nl-BE" smtClean="0"/>
-              <a:t>27/01/2022</a:t>
+              <a:t>13/01/2023</a:t>
             </a:fld>
             <a:endParaRPr lang="nl-BE"/>
           </a:p>
@@ -3981,7 +3981,7 @@
           <a:p>
             <a:fld id="{5BE27D71-2267-4E44-9F33-05B60E5C7D9D}" type="datetime1">
               <a:rPr lang="nl-BE" smtClean="0"/>
-              <a:t>27/01/2022</a:t>
+              <a:t>13/01/2023</a:t>
             </a:fld>
             <a:endParaRPr lang="nl-BE"/>
           </a:p>
@@ -4258,7 +4258,7 @@
           <a:p>
             <a:fld id="{182F587C-96C8-4813-A767-3084061A3229}" type="datetime1">
               <a:rPr lang="nl-BE" smtClean="0"/>
-              <a:t>27/01/2022</a:t>
+              <a:t>13/01/2023</a:t>
             </a:fld>
             <a:endParaRPr lang="nl-BE"/>
           </a:p>
@@ -4511,7 +4511,7 @@
           <a:p>
             <a:fld id="{8B021CF8-BBBB-4DFA-8713-49842AA07274}" type="datetime1">
               <a:rPr lang="nl-BE" smtClean="0"/>
-              <a:t>27/01/2022</a:t>
+              <a:t>13/01/2023</a:t>
             </a:fld>
             <a:endParaRPr lang="nl-BE"/>
           </a:p>
@@ -4724,7 +4724,7 @@
           <a:p>
             <a:fld id="{CDBFABB5-0AB3-4CB6-A705-6887DEB1F9F2}" type="datetime1">
               <a:rPr lang="nl-BE" smtClean="0"/>
-              <a:t>27/01/2022</a:t>
+              <a:t>13/01/2023</a:t>
             </a:fld>
             <a:endParaRPr lang="nl-BE"/>
           </a:p>
@@ -5246,6 +5246,87 @@
           </a:p>
         </p:txBody>
       </p:sp>
+      <p:pic>
+        <p:nvPicPr>
+          <p:cNvPr id="5" name="Picture 4">
+            <a:extLst>
+              <a:ext uri="{FF2B5EF4-FFF2-40B4-BE49-F238E27FC236}">
+                <a16:creationId xmlns:a16="http://schemas.microsoft.com/office/drawing/2014/main" id="{BEFDE171-9261-A020-5482-4FFBB4340426}"/>
+              </a:ext>
+            </a:extLst>
+          </p:cNvPr>
+          <p:cNvPicPr>
+            <a:picLocks noChangeAspect="1"/>
+          </p:cNvPicPr>
+          <p:nvPr/>
+        </p:nvPicPr>
+        <p:blipFill>
+          <a:blip r:embed="rId4">
+            <a:extLst>
+              <a:ext uri="{28A0092B-C50C-407E-A947-70E740481C1C}">
+                <a14:useLocalDpi xmlns:a14="http://schemas.microsoft.com/office/drawing/2010/main" val="0"/>
+              </a:ext>
+            </a:extLst>
+          </a:blip>
+          <a:stretch>
+            <a:fillRect/>
+          </a:stretch>
+        </p:blipFill>
+        <p:spPr>
+          <a:xfrm>
+            <a:off x="688120" y="1033463"/>
+            <a:ext cx="2085975" cy="352425"/>
+          </a:xfrm>
+          <a:prstGeom prst="rect">
+            <a:avLst/>
+          </a:prstGeom>
+        </p:spPr>
+      </p:pic>
+      <p:pic>
+        <p:nvPicPr>
+          <p:cNvPr id="7" name="Picture 4">
+            <a:extLst>
+              <a:ext uri="{FF2B5EF4-FFF2-40B4-BE49-F238E27FC236}">
+                <a16:creationId xmlns:a16="http://schemas.microsoft.com/office/drawing/2014/main" id="{FC737E69-BEBE-DB24-C46E-26CE50DED9A6}"/>
+              </a:ext>
+            </a:extLst>
+          </p:cNvPr>
+          <p:cNvPicPr>
+            <a:picLocks noChangeAspect="1" noChangeArrowheads="1"/>
+          </p:cNvPicPr>
+          <p:nvPr/>
+        </p:nvPicPr>
+        <p:blipFill rotWithShape="1">
+          <a:blip r:embed="rId5" cstate="print">
+            <a:extLst>
+              <a:ext uri="{28A0092B-C50C-407E-A947-70E740481C1C}">
+                <a14:useLocalDpi xmlns:a14="http://schemas.microsoft.com/office/drawing/2010/main" val="0"/>
+              </a:ext>
+            </a:extLst>
+          </a:blip>
+          <a:srcRect b="16829"/>
+          <a:stretch/>
+        </p:blipFill>
+        <p:spPr bwMode="auto">
+          <a:xfrm>
+            <a:off x="7005153" y="322114"/>
+            <a:ext cx="1534493" cy="1422699"/>
+          </a:xfrm>
+          <a:prstGeom prst="rect">
+            <a:avLst/>
+          </a:prstGeom>
+          <a:noFill/>
+          <a:extLst>
+            <a:ext uri="{909E8E84-426E-40DD-AFC4-6F175D3DCCD1}">
+              <a14:hiddenFill xmlns:a14="http://schemas.microsoft.com/office/drawing/2010/main">
+                <a:solidFill>
+                  <a:srgbClr val="FFFFFF"/>
+                </a:solidFill>
+              </a14:hiddenFill>
+            </a:ext>
+          </a:extLst>
+        </p:spPr>
+      </p:pic>
     </p:spTree>
     <p:extLst>
       <p:ext uri="{BB962C8B-B14F-4D97-AF65-F5344CB8AC3E}">
@@ -11713,12 +11794,12 @@
           <a:graphicData uri="http://schemas.openxmlformats.org/presentationml/2006/ole">
             <mc:AlternateContent xmlns:mc="http://schemas.openxmlformats.org/markup-compatibility/2006">
               <mc:Choice xmlns:v="urn:schemas-microsoft-com:vml" Requires="v">
-                <p:oleObj spid="_x0000_s2056" name="Equation" r:id="rId3" imgW="812520" imgH="393480" progId="Equation.3">
+                <p:oleObj name="Equation" r:id="rId2" imgW="812520" imgH="393480" progId="Equation.3">
                   <p:embed/>
                 </p:oleObj>
               </mc:Choice>
               <mc:Fallback>
-                <p:oleObj name="Equation" r:id="rId3" imgW="812520" imgH="393480" progId="Equation.3">
+                <p:oleObj name="Equation" r:id="rId2" imgW="812520" imgH="393480" progId="Equation.3">
                   <p:embed/>
                   <p:pic>
                     <p:nvPicPr>
@@ -11727,7 +11808,7 @@
                       <p:nvPr/>
                     </p:nvPicPr>
                     <p:blipFill>
-                      <a:blip r:embed="rId4"/>
+                      <a:blip r:embed="rId3"/>
                       <a:stretch>
                         <a:fillRect/>
                       </a:stretch>
@@ -11770,12 +11851,12 @@
           <a:graphicData uri="http://schemas.openxmlformats.org/presentationml/2006/ole">
             <mc:AlternateContent xmlns:mc="http://schemas.openxmlformats.org/markup-compatibility/2006">
               <mc:Choice xmlns:v="urn:schemas-microsoft-com:vml" Requires="v">
-                <p:oleObj spid="_x0000_s2057" name="Equation" r:id="rId5" imgW="2489040" imgH="431640" progId="Equation.3">
+                <p:oleObj name="Equation" r:id="rId4" imgW="2489040" imgH="431640" progId="Equation.3">
                   <p:embed/>
                 </p:oleObj>
               </mc:Choice>
               <mc:Fallback>
-                <p:oleObj name="Equation" r:id="rId5" imgW="2489040" imgH="431640" progId="Equation.3">
+                <p:oleObj name="Equation" r:id="rId4" imgW="2489040" imgH="431640" progId="Equation.3">
                   <p:embed/>
                   <p:pic>
                     <p:nvPicPr>
@@ -11784,7 +11865,7 @@
                       <p:nvPr/>
                     </p:nvPicPr>
                     <p:blipFill>
-                      <a:blip r:embed="rId6"/>
+                      <a:blip r:embed="rId5"/>
                       <a:stretch>
                         <a:fillRect/>
                       </a:stretch>
@@ -22270,12 +22351,12 @@
           <a:graphicData uri="http://schemas.openxmlformats.org/presentationml/2006/ole">
             <mc:AlternateContent xmlns:mc="http://schemas.openxmlformats.org/markup-compatibility/2006">
               <mc:Choice xmlns:v="urn:schemas-microsoft-com:vml" Requires="v">
-                <p:oleObj spid="_x0000_s3080" name="Equation" r:id="rId3" imgW="1091880" imgH="1041120" progId="Equation.3">
+                <p:oleObj name="Equation" r:id="rId2" imgW="1091880" imgH="1041120" progId="Equation.3">
                   <p:embed/>
                 </p:oleObj>
               </mc:Choice>
               <mc:Fallback>
-                <p:oleObj name="Equation" r:id="rId3" imgW="1091880" imgH="1041120" progId="Equation.3">
+                <p:oleObj name="Equation" r:id="rId2" imgW="1091880" imgH="1041120" progId="Equation.3">
                   <p:embed/>
                   <p:pic>
                     <p:nvPicPr>
@@ -22284,7 +22365,7 @@
                       <p:nvPr/>
                     </p:nvPicPr>
                     <p:blipFill>
-                      <a:blip r:embed="rId4"/>
+                      <a:blip r:embed="rId3"/>
                       <a:stretch>
                         <a:fillRect/>
                       </a:stretch>
@@ -23625,12 +23706,12 @@
           <a:graphicData uri="http://schemas.openxmlformats.org/presentationml/2006/ole">
             <mc:AlternateContent xmlns:mc="http://schemas.openxmlformats.org/markup-compatibility/2006">
               <mc:Choice xmlns:v="urn:schemas-microsoft-com:vml" Requires="v">
-                <p:oleObj spid="_x0000_s3081" name="Equation" r:id="rId5" imgW="1091880" imgH="1041120" progId="Equation.3">
+                <p:oleObj name="Equation" r:id="rId4" imgW="1091880" imgH="1041120" progId="Equation.3">
                   <p:embed/>
                 </p:oleObj>
               </mc:Choice>
               <mc:Fallback>
-                <p:oleObj name="Equation" r:id="rId5" imgW="1091880" imgH="1041120" progId="Equation.3">
+                <p:oleObj name="Equation" r:id="rId4" imgW="1091880" imgH="1041120" progId="Equation.3">
                   <p:embed/>
                   <p:pic>
                     <p:nvPicPr>
@@ -23639,7 +23720,7 @@
                       <p:nvPr/>
                     </p:nvPicPr>
                     <p:blipFill>
-                      <a:blip r:embed="rId4"/>
+                      <a:blip r:embed="rId3"/>
                       <a:stretch>
                         <a:fillRect/>
                       </a:stretch>
@@ -44614,12 +44695,12 @@
           <a:graphicData uri="http://schemas.openxmlformats.org/presentationml/2006/ole">
             <mc:AlternateContent xmlns:mc="http://schemas.openxmlformats.org/markup-compatibility/2006">
               <mc:Choice xmlns:v="urn:schemas-microsoft-com:vml" Requires="v">
-                <p:oleObj spid="_x0000_s1029" name="Equation" r:id="rId3" imgW="965160" imgH="228600" progId="Equation.3">
+                <p:oleObj name="Equation" r:id="rId2" imgW="965160" imgH="228600" progId="Equation.3">
                   <p:embed/>
                 </p:oleObj>
               </mc:Choice>
               <mc:Fallback>
-                <p:oleObj name="Equation" r:id="rId3" imgW="965160" imgH="228600" progId="Equation.3">
+                <p:oleObj name="Equation" r:id="rId2" imgW="965160" imgH="228600" progId="Equation.3">
                   <p:embed/>
                   <p:pic>
                     <p:nvPicPr>
@@ -44628,7 +44709,7 @@
                       <p:nvPr/>
                     </p:nvPicPr>
                     <p:blipFill>
-                      <a:blip r:embed="rId4"/>
+                      <a:blip r:embed="rId3"/>
                       <a:stretch>
                         <a:fillRect/>
                       </a:stretch>
@@ -46233,7 +46314,7 @@
         <p:spPr>
           <a:xfrm>
             <a:off x="1187624" y="2276872"/>
-            <a:ext cx="7629012" cy="369332"/>
+            <a:ext cx="7766870" cy="369332"/>
           </a:xfrm>
           <a:prstGeom prst="rect">
             <a:avLst/>
@@ -46299,7 +46380,7 @@
         <p:spPr>
           <a:xfrm>
             <a:off x="1187624" y="4139788"/>
-            <a:ext cx="7629012" cy="369332"/>
+            <a:ext cx="7766870" cy="369332"/>
           </a:xfrm>
           <a:prstGeom prst="rect">
             <a:avLst/>
@@ -46333,7 +46414,7 @@
                 <a:latin typeface="Courier New" panose="02070309020205020404" pitchFamily="49" charset="0"/>
                 <a:cs typeface="Courier New" panose="02070309020205020404" pitchFamily="49" charset="0"/>
               </a:rPr>
-              <a:t>  -prof-use  prof-</a:t>
+              <a:t>  -prof-use  -prof-</a:t>
             </a:r>
             <a:r>
               <a:rPr lang="en-US" dirty="0" err="1">

</xml_diff>

<commit_message>
Add explanation for acronym UPI
</commit_message>
<xml_diff>
--- a/code_optimization.pptx
+++ b/code_optimization.pptx
@@ -17473,6 +17473,42 @@
           </a:p>
         </p:txBody>
       </p:sp>
+      <p:sp>
+        <p:nvSpPr>
+          <p:cNvPr id="18" name="TextBox 17">
+            <a:extLst>
+              <a:ext uri="{FF2B5EF4-FFF2-40B4-BE49-F238E27FC236}">
+                <a16:creationId xmlns:a16="http://schemas.microsoft.com/office/drawing/2014/main" id="{FB123B30-C153-E276-F448-F8D1A1EBA986}"/>
+              </a:ext>
+            </a:extLst>
+          </p:cNvPr>
+          <p:cNvSpPr txBox="1"/>
+          <p:nvPr/>
+        </p:nvSpPr>
+        <p:spPr>
+          <a:xfrm>
+            <a:off x="4211960" y="6093296"/>
+            <a:ext cx="3599960" cy="369332"/>
+          </a:xfrm>
+          <a:prstGeom prst="rect">
+            <a:avLst/>
+          </a:prstGeom>
+          <a:noFill/>
+        </p:spPr>
+        <p:txBody>
+          <a:bodyPr wrap="none" rtlCol="0">
+            <a:spAutoFit/>
+          </a:bodyPr>
+          <a:lstStyle/>
+          <a:p>
+            <a:r>
+              <a:rPr lang="en-US" dirty="0"/>
+              <a:t>UPI = Ultra Path Interconnect (Intel)</a:t>
+            </a:r>
+            <a:endParaRPr lang="LID4096" dirty="0"/>
+          </a:p>
+        </p:txBody>
+      </p:sp>
     </p:spTree>
     <p:extLst>
       <p:ext uri="{BB962C8B-B14F-4D97-AF65-F5344CB8AC3E}">

</xml_diff>

<commit_message>
Fix value of pi
</commit_message>
<xml_diff>
--- a/code_optimization.pptx
+++ b/code_optimization.pptx
@@ -32619,7 +32619,7 @@
                 <a:latin typeface="Courier New" panose="02070309020205020404" pitchFamily="49" charset="0"/>
                 <a:cs typeface="Courier New" panose="02070309020205020404" pitchFamily="49" charset="0"/>
               </a:rPr>
-              <a:t>    return 3.1425927*radius*radius;</a:t>
+              <a:t>    return 3.1415927*radius*radius;</a:t>
             </a:r>
           </a:p>
           <a:p>
@@ -32828,7 +32828,7 @@
                 <a:latin typeface="Courier New" panose="02070309020205020404" pitchFamily="49" charset="0"/>
                 <a:cs typeface="Courier New" panose="02070309020205020404" pitchFamily="49" charset="0"/>
               </a:rPr>
-              <a:t>    return 3.1425927f*radius*radius;</a:t>
+              <a:t>    return 3.1415927f*radius*radius;</a:t>
             </a:r>
           </a:p>
           <a:p>

</xml_diff>